<commit_message>
better outline for 04
</commit_message>
<xml_diff>
--- a/server/presentations/04_N1QL Details.pptx
+++ b/server/presentations/04_N1QL Details.pptx
@@ -5,39 +5,48 @@
     <p:sldMasterId id="2147483648" r:id="rId1"/>
   </p:sldMasterIdLst>
   <p:notesMasterIdLst>
-    <p:notesMasterId r:id="rId29"/>
+    <p:notesMasterId r:id="rId38"/>
   </p:notesMasterIdLst>
   <p:handoutMasterIdLst>
-    <p:handoutMasterId r:id="rId30"/>
+    <p:handoutMasterId r:id="rId39"/>
   </p:handoutMasterIdLst>
   <p:sldIdLst>
     <p:sldId id="256" r:id="rId2"/>
     <p:sldId id="283" r:id="rId3"/>
     <p:sldId id="293" r:id="rId4"/>
     <p:sldId id="295" r:id="rId5"/>
-    <p:sldId id="290" r:id="rId6"/>
-    <p:sldId id="291" r:id="rId7"/>
-    <p:sldId id="292" r:id="rId8"/>
-    <p:sldId id="285" r:id="rId9"/>
-    <p:sldId id="284" r:id="rId10"/>
-    <p:sldId id="288" r:id="rId11"/>
-    <p:sldId id="287" r:id="rId12"/>
-    <p:sldId id="286" r:id="rId13"/>
-    <p:sldId id="289" r:id="rId14"/>
-    <p:sldId id="294" r:id="rId15"/>
-    <p:sldId id="279" r:id="rId16"/>
-    <p:sldId id="280" r:id="rId17"/>
-    <p:sldId id="281" r:id="rId18"/>
-    <p:sldId id="264" r:id="rId19"/>
-    <p:sldId id="270" r:id="rId20"/>
-    <p:sldId id="276" r:id="rId21"/>
-    <p:sldId id="277" r:id="rId22"/>
-    <p:sldId id="272" r:id="rId23"/>
-    <p:sldId id="275" r:id="rId24"/>
-    <p:sldId id="273" r:id="rId25"/>
-    <p:sldId id="274" r:id="rId26"/>
-    <p:sldId id="267" r:id="rId27"/>
-    <p:sldId id="269" r:id="rId28"/>
+    <p:sldId id="298" r:id="rId6"/>
+    <p:sldId id="296" r:id="rId7"/>
+    <p:sldId id="297" r:id="rId8"/>
+    <p:sldId id="299" r:id="rId9"/>
+    <p:sldId id="300" r:id="rId10"/>
+    <p:sldId id="301" r:id="rId11"/>
+    <p:sldId id="302" r:id="rId12"/>
+    <p:sldId id="304" r:id="rId13"/>
+    <p:sldId id="303" r:id="rId14"/>
+    <p:sldId id="290" r:id="rId15"/>
+    <p:sldId id="291" r:id="rId16"/>
+    <p:sldId id="292" r:id="rId17"/>
+    <p:sldId id="285" r:id="rId18"/>
+    <p:sldId id="284" r:id="rId19"/>
+    <p:sldId id="288" r:id="rId20"/>
+    <p:sldId id="287" r:id="rId21"/>
+    <p:sldId id="286" r:id="rId22"/>
+    <p:sldId id="289" r:id="rId23"/>
+    <p:sldId id="294" r:id="rId24"/>
+    <p:sldId id="279" r:id="rId25"/>
+    <p:sldId id="280" r:id="rId26"/>
+    <p:sldId id="281" r:id="rId27"/>
+    <p:sldId id="264" r:id="rId28"/>
+    <p:sldId id="270" r:id="rId29"/>
+    <p:sldId id="276" r:id="rId30"/>
+    <p:sldId id="277" r:id="rId31"/>
+    <p:sldId id="272" r:id="rId32"/>
+    <p:sldId id="275" r:id="rId33"/>
+    <p:sldId id="273" r:id="rId34"/>
+    <p:sldId id="274" r:id="rId35"/>
+    <p:sldId id="267" r:id="rId36"/>
+    <p:sldId id="269" r:id="rId37"/>
   </p:sldIdLst>
   <p:sldSz cx="9144000" cy="5143500" type="screen16x9"/>
   <p:notesSz cx="6858000" cy="9144000"/>
@@ -595,11 +604,11 @@
           <c:showBubbleSize val="0"/>
         </c:dLbls>
         <c:gapWidth val="150"/>
-        <c:axId val="-2096436856"/>
-        <c:axId val="-2096433528"/>
+        <c:axId val="-2084026952"/>
+        <c:axId val="-2081221512"/>
       </c:barChart>
       <c:catAx>
-        <c:axId val="-2096436856"/>
+        <c:axId val="-2084026952"/>
         <c:scaling>
           <c:orientation val="minMax"/>
         </c:scaling>
@@ -625,7 +634,7 @@
             <a:endParaRPr lang="de-DE"/>
           </a:p>
         </c:txPr>
-        <c:crossAx val="-2096433528"/>
+        <c:crossAx val="-2081221512"/>
         <c:crosses val="autoZero"/>
         <c:auto val="1"/>
         <c:lblAlgn val="ctr"/>
@@ -633,7 +642,7 @@
         <c:noMultiLvlLbl val="0"/>
       </c:catAx>
       <c:valAx>
-        <c:axId val="-2096433528"/>
+        <c:axId val="-2081221512"/>
         <c:scaling>
           <c:orientation val="minMax"/>
         </c:scaling>
@@ -675,7 +684,7 @@
             <a:endParaRPr lang="de-DE"/>
           </a:p>
         </c:txPr>
-        <c:crossAx val="-2096436856"/>
+        <c:crossAx val="-2084026952"/>
         <c:crosses val="autoZero"/>
         <c:crossBetween val="between"/>
       </c:valAx>
@@ -917,11 +926,11 @@
           <c:showBubbleSize val="0"/>
         </c:dLbls>
         <c:gapWidth val="150"/>
-        <c:axId val="-2094070248"/>
-        <c:axId val="-2094066920"/>
+        <c:axId val="-2092527144"/>
+        <c:axId val="-2092523928"/>
       </c:barChart>
       <c:catAx>
-        <c:axId val="-2094070248"/>
+        <c:axId val="-2092527144"/>
         <c:scaling>
           <c:orientation val="minMax"/>
         </c:scaling>
@@ -947,7 +956,7 @@
             <a:endParaRPr lang="de-DE"/>
           </a:p>
         </c:txPr>
-        <c:crossAx val="-2094066920"/>
+        <c:crossAx val="-2092523928"/>
         <c:crosses val="autoZero"/>
         <c:auto val="1"/>
         <c:lblAlgn val="ctr"/>
@@ -955,7 +964,7 @@
         <c:noMultiLvlLbl val="0"/>
       </c:catAx>
       <c:valAx>
-        <c:axId val="-2094066920"/>
+        <c:axId val="-2092523928"/>
         <c:scaling>
           <c:orientation val="minMax"/>
         </c:scaling>
@@ -997,7 +1006,7 @@
             <a:endParaRPr lang="de-DE"/>
           </a:p>
         </c:txPr>
-        <c:crossAx val="-2094070248"/>
+        <c:crossAx val="-2092527144"/>
         <c:crosses val="autoZero"/>
         <c:crossBetween val="between"/>
       </c:valAx>
@@ -1247,11 +1256,11 @@
         </c:dLbls>
         <c:marker val="1"/>
         <c:smooth val="0"/>
-        <c:axId val="-2094025192"/>
-        <c:axId val="-2094668168"/>
+        <c:axId val="-2147303112"/>
+        <c:axId val="-2092769208"/>
       </c:lineChart>
       <c:catAx>
-        <c:axId val="-2094025192"/>
+        <c:axId val="-2147303112"/>
         <c:scaling>
           <c:orientation val="minMax"/>
         </c:scaling>
@@ -1277,7 +1286,7 @@
             <a:endParaRPr lang="de-DE"/>
           </a:p>
         </c:txPr>
-        <c:crossAx val="-2094668168"/>
+        <c:crossAx val="-2092769208"/>
         <c:crosses val="autoZero"/>
         <c:auto val="1"/>
         <c:lblAlgn val="ctr"/>
@@ -1285,7 +1294,7 @@
         <c:noMultiLvlLbl val="0"/>
       </c:catAx>
       <c:valAx>
-        <c:axId val="-2094668168"/>
+        <c:axId val="-2092769208"/>
         <c:scaling>
           <c:orientation val="minMax"/>
         </c:scaling>
@@ -1325,7 +1334,7 @@
             <a:endParaRPr lang="de-DE"/>
           </a:p>
         </c:txPr>
-        <c:crossAx val="-2094025192"/>
+        <c:crossAx val="-2147303112"/>
         <c:crosses val="autoZero"/>
         <c:crossBetween val="between"/>
       </c:valAx>
@@ -1447,7 +1456,7 @@
           <a:p>
             <a:fld id="{B5389E1E-C654-E943-9883-792E99AD7287}" type="datetimeFigureOut">
               <a:rPr lang="en-US" smtClean="0"/>
-              <a:t>22/05/15</a:t>
+              <a:t>25/05/15</a:t>
             </a:fld>
             <a:endParaRPr lang="en-US"/>
           </a:p>
@@ -1613,7 +1622,7 @@
           <a:p>
             <a:fld id="{9920D99B-2862-464A-984E-65BFC5FC0BBC}" type="datetimeFigureOut">
               <a:rPr lang="en-US" smtClean="0"/>
-              <a:t>22/05/15</a:t>
+              <a:t>25/05/15</a:t>
             </a:fld>
             <a:endParaRPr lang="en-US"/>
           </a:p>
@@ -2008,7 +2017,7 @@
                 <a:latin typeface="Calibri"/>
               </a:rPr>
               <a:pPr/>
-              <a:t>10</a:t>
+              <a:t>19</a:t>
             </a:fld>
             <a:endParaRPr lang="en-US">
               <a:solidFill>
@@ -2097,7 +2106,7 @@
           <a:p>
             <a:fld id="{615C908D-C35B-B346-A739-79C621D2BD36}" type="slidenum">
               <a:rPr lang="en-US" smtClean="0"/>
-              <a:t>11</a:t>
+              <a:t>20</a:t>
             </a:fld>
             <a:endParaRPr lang="en-US"/>
           </a:p>
@@ -4949,6 +4958,1272 @@
       </p:grpSpPr>
       <p:sp>
         <p:nvSpPr>
+          <p:cNvPr id="2" name="Title 1"/>
+          <p:cNvSpPr>
+            <a:spLocks noGrp="1"/>
+          </p:cNvSpPr>
+          <p:nvPr>
+            <p:ph type="ctrTitle"/>
+          </p:nvPr>
+        </p:nvSpPr>
+        <p:spPr/>
+        <p:txBody>
+          <a:bodyPr/>
+          <a:lstStyle/>
+          <a:p>
+            <a:r>
+              <a:rPr lang="en-US" dirty="0" smtClean="0"/>
+              <a:t>Advanced Queries</a:t>
+            </a:r>
+            <a:endParaRPr lang="en-US" dirty="0"/>
+          </a:p>
+        </p:txBody>
+      </p:sp>
+    </p:spTree>
+    <p:extLst>
+      <p:ext uri="{BB962C8B-B14F-4D97-AF65-F5344CB8AC3E}">
+        <p14:creationId xmlns:p14="http://schemas.microsoft.com/office/powerpoint/2010/main" val="3793485633"/>
+      </p:ext>
+    </p:extLst>
+  </p:cSld>
+  <p:clrMapOvr>
+    <a:masterClrMapping/>
+  </p:clrMapOvr>
+  <p:timing>
+    <p:tnLst>
+      <p:par>
+        <p:cTn xmlns:p14="http://schemas.microsoft.com/office/powerpoint/2010/main" id="1" dur="indefinite" restart="never" nodeType="tmRoot"/>
+      </p:par>
+    </p:tnLst>
+  </p:timing>
+</p:sld>
+</file>
+
+<file path=ppt/slides/slide11.xml><?xml version="1.0" encoding="utf-8"?>
+<p:sld xmlns:a="http://schemas.openxmlformats.org/drawingml/2006/main" xmlns:r="http://schemas.openxmlformats.org/officeDocument/2006/relationships" xmlns:p="http://schemas.openxmlformats.org/presentationml/2006/main">
+  <p:cSld>
+    <p:spTree>
+      <p:nvGrpSpPr>
+        <p:cNvPr id="1" name=""/>
+        <p:cNvGrpSpPr/>
+        <p:nvPr/>
+      </p:nvGrpSpPr>
+      <p:grpSpPr>
+        <a:xfrm>
+          <a:off x="0" y="0"/>
+          <a:ext cx="0" cy="0"/>
+          <a:chOff x="0" y="0"/>
+          <a:chExt cx="0" cy="0"/>
+        </a:xfrm>
+      </p:grpSpPr>
+      <p:sp>
+        <p:nvSpPr>
+          <p:cNvPr id="2" name="Title 1"/>
+          <p:cNvSpPr>
+            <a:spLocks noGrp="1"/>
+          </p:cNvSpPr>
+          <p:nvPr>
+            <p:ph type="title"/>
+          </p:nvPr>
+        </p:nvSpPr>
+        <p:spPr/>
+        <p:txBody>
+          <a:bodyPr/>
+          <a:lstStyle/>
+          <a:p>
+            <a:r>
+              <a:rPr lang="en-US" dirty="0" smtClean="0"/>
+              <a:t>Read Your Writes</a:t>
+            </a:r>
+            <a:endParaRPr lang="en-US" dirty="0"/>
+          </a:p>
+        </p:txBody>
+      </p:sp>
+      <p:sp>
+        <p:nvSpPr>
+          <p:cNvPr id="3" name="Content Placeholder 2"/>
+          <p:cNvSpPr>
+            <a:spLocks noGrp="1"/>
+          </p:cNvSpPr>
+          <p:nvPr>
+            <p:ph idx="1"/>
+          </p:nvPr>
+        </p:nvSpPr>
+        <p:spPr>
+          <a:xfrm>
+            <a:off x="457200" y="955193"/>
+            <a:ext cx="8007739" cy="3493655"/>
+          </a:xfrm>
+        </p:spPr>
+        <p:txBody>
+          <a:bodyPr/>
+          <a:lstStyle/>
+          <a:p>
+            <a:pPr>
+              <a:lnSpc>
+                <a:spcPct val="140000"/>
+              </a:lnSpc>
+            </a:pPr>
+            <a:endParaRPr lang="en-US" dirty="0" smtClean="0"/>
+          </a:p>
+        </p:txBody>
+      </p:sp>
+    </p:spTree>
+    <p:extLst>
+      <p:ext uri="{BB962C8B-B14F-4D97-AF65-F5344CB8AC3E}">
+        <p14:creationId xmlns:p14="http://schemas.microsoft.com/office/powerpoint/2010/main" val="3563268453"/>
+      </p:ext>
+    </p:extLst>
+  </p:cSld>
+  <p:clrMapOvr>
+    <a:masterClrMapping/>
+  </p:clrMapOvr>
+  <p:timing>
+    <p:tnLst>
+      <p:par>
+        <p:cTn xmlns:p14="http://schemas.microsoft.com/office/powerpoint/2010/main" id="1" dur="indefinite" restart="never" nodeType="tmRoot">
+          <p:childTnLst>
+            <p:seq concurrent="1" nextAc="seek">
+              <p:cTn id="2" dur="indefinite" nodeType="mainSeq">
+                <p:childTnLst>
+                  <p:par>
+                    <p:cTn id="3" fill="hold">
+                      <p:stCondLst>
+                        <p:cond delay="indefinite"/>
+                      </p:stCondLst>
+                      <p:childTnLst>
+                        <p:par>
+                          <p:cTn id="4" fill="hold">
+                            <p:stCondLst>
+                              <p:cond delay="0"/>
+                            </p:stCondLst>
+                            <p:childTnLst>
+                              <p:par>
+                                <p:cTn id="5" presetID="10" presetClass="entr" presetSubtype="0" fill="hold" grpId="0" nodeType="clickEffect" nodePh="1">
+                                  <p:stCondLst>
+                                    <p:cond delay="0"/>
+                                  </p:stCondLst>
+                                  <p:endCondLst>
+                                    <p:cond evt="begin" delay="0">
+                                      <p:tn val="5"/>
+                                    </p:cond>
+                                  </p:endCondLst>
+                                  <p:childTnLst>
+                                    <p:set>
+                                      <p:cBhvr>
+                                        <p:cTn id="6" dur="1" fill="hold">
+                                          <p:stCondLst>
+                                            <p:cond delay="0"/>
+                                          </p:stCondLst>
+                                        </p:cTn>
+                                        <p:tgtEl>
+                                          <p:spTgt spid="3">
+                                            <p:txEl>
+                                              <p:pRg st="0" end="0"/>
+                                            </p:txEl>
+                                          </p:spTgt>
+                                        </p:tgtEl>
+                                        <p:attrNameLst>
+                                          <p:attrName>style.visibility</p:attrName>
+                                        </p:attrNameLst>
+                                      </p:cBhvr>
+                                      <p:to>
+                                        <p:strVal val="visible"/>
+                                      </p:to>
+                                    </p:set>
+                                    <p:animEffect transition="in" filter="fade">
+                                      <p:cBhvr>
+                                        <p:cTn id="7" dur="500"/>
+                                        <p:tgtEl>
+                                          <p:spTgt spid="3">
+                                            <p:txEl>
+                                              <p:pRg st="0" end="0"/>
+                                            </p:txEl>
+                                          </p:spTgt>
+                                        </p:tgtEl>
+                                      </p:cBhvr>
+                                    </p:animEffect>
+                                  </p:childTnLst>
+                                </p:cTn>
+                              </p:par>
+                            </p:childTnLst>
+                          </p:cTn>
+                        </p:par>
+                      </p:childTnLst>
+                    </p:cTn>
+                  </p:par>
+                </p:childTnLst>
+              </p:cTn>
+              <p:prevCondLst>
+                <p:cond evt="onPrev" delay="0">
+                  <p:tgtEl>
+                    <p:sldTgt/>
+                  </p:tgtEl>
+                </p:cond>
+              </p:prevCondLst>
+              <p:nextCondLst>
+                <p:cond evt="onNext" delay="0">
+                  <p:tgtEl>
+                    <p:sldTgt/>
+                  </p:tgtEl>
+                </p:cond>
+              </p:nextCondLst>
+            </p:seq>
+          </p:childTnLst>
+        </p:cTn>
+      </p:par>
+    </p:tnLst>
+    <p:bldLst>
+      <p:bldP spid="3" grpId="0" build="p"/>
+    </p:bldLst>
+  </p:timing>
+</p:sld>
+</file>
+
+<file path=ppt/slides/slide12.xml><?xml version="1.0" encoding="utf-8"?>
+<p:sld xmlns:a="http://schemas.openxmlformats.org/drawingml/2006/main" xmlns:r="http://schemas.openxmlformats.org/officeDocument/2006/relationships" xmlns:p="http://schemas.openxmlformats.org/presentationml/2006/main">
+  <p:cSld>
+    <p:spTree>
+      <p:nvGrpSpPr>
+        <p:cNvPr id="1" name=""/>
+        <p:cNvGrpSpPr/>
+        <p:nvPr/>
+      </p:nvGrpSpPr>
+      <p:grpSpPr>
+        <a:xfrm>
+          <a:off x="0" y="0"/>
+          <a:ext cx="0" cy="0"/>
+          <a:chOff x="0" y="0"/>
+          <a:chExt cx="0" cy="0"/>
+        </a:xfrm>
+      </p:grpSpPr>
+      <p:sp>
+        <p:nvSpPr>
+          <p:cNvPr id="2" name="Title 1"/>
+          <p:cNvSpPr>
+            <a:spLocks noGrp="1"/>
+          </p:cNvSpPr>
+          <p:nvPr>
+            <p:ph type="title"/>
+          </p:nvPr>
+        </p:nvSpPr>
+        <p:spPr/>
+        <p:txBody>
+          <a:bodyPr/>
+          <a:lstStyle/>
+          <a:p>
+            <a:r>
+              <a:rPr lang="en-US" dirty="0" smtClean="0"/>
+              <a:t>Parameterized Queries</a:t>
+            </a:r>
+            <a:endParaRPr lang="en-US" dirty="0"/>
+          </a:p>
+        </p:txBody>
+      </p:sp>
+      <p:sp>
+        <p:nvSpPr>
+          <p:cNvPr id="3" name="Content Placeholder 2"/>
+          <p:cNvSpPr>
+            <a:spLocks noGrp="1"/>
+          </p:cNvSpPr>
+          <p:nvPr>
+            <p:ph idx="1"/>
+          </p:nvPr>
+        </p:nvSpPr>
+        <p:spPr>
+          <a:xfrm>
+            <a:off x="457200" y="955193"/>
+            <a:ext cx="8007739" cy="3493655"/>
+          </a:xfrm>
+        </p:spPr>
+        <p:txBody>
+          <a:bodyPr/>
+          <a:lstStyle/>
+          <a:p>
+            <a:pPr>
+              <a:lnSpc>
+                <a:spcPct val="140000"/>
+              </a:lnSpc>
+            </a:pPr>
+            <a:endParaRPr lang="en-US" dirty="0" smtClean="0"/>
+          </a:p>
+        </p:txBody>
+      </p:sp>
+    </p:spTree>
+    <p:extLst>
+      <p:ext uri="{BB962C8B-B14F-4D97-AF65-F5344CB8AC3E}">
+        <p14:creationId xmlns:p14="http://schemas.microsoft.com/office/powerpoint/2010/main" val="1090567114"/>
+      </p:ext>
+    </p:extLst>
+  </p:cSld>
+  <p:clrMapOvr>
+    <a:masterClrMapping/>
+  </p:clrMapOvr>
+  <p:timing>
+    <p:tnLst>
+      <p:par>
+        <p:cTn xmlns:p14="http://schemas.microsoft.com/office/powerpoint/2010/main" id="1" dur="indefinite" restart="never" nodeType="tmRoot">
+          <p:childTnLst>
+            <p:seq concurrent="1" nextAc="seek">
+              <p:cTn id="2" dur="indefinite" nodeType="mainSeq">
+                <p:childTnLst>
+                  <p:par>
+                    <p:cTn id="3" fill="hold">
+                      <p:stCondLst>
+                        <p:cond delay="indefinite"/>
+                      </p:stCondLst>
+                      <p:childTnLst>
+                        <p:par>
+                          <p:cTn id="4" fill="hold">
+                            <p:stCondLst>
+                              <p:cond delay="0"/>
+                            </p:stCondLst>
+                            <p:childTnLst>
+                              <p:par>
+                                <p:cTn id="5" presetID="10" presetClass="entr" presetSubtype="0" fill="hold" grpId="0" nodeType="clickEffect" nodePh="1">
+                                  <p:stCondLst>
+                                    <p:cond delay="0"/>
+                                  </p:stCondLst>
+                                  <p:endCondLst>
+                                    <p:cond evt="begin" delay="0">
+                                      <p:tn val="5"/>
+                                    </p:cond>
+                                  </p:endCondLst>
+                                  <p:childTnLst>
+                                    <p:set>
+                                      <p:cBhvr>
+                                        <p:cTn id="6" dur="1" fill="hold">
+                                          <p:stCondLst>
+                                            <p:cond delay="0"/>
+                                          </p:stCondLst>
+                                        </p:cTn>
+                                        <p:tgtEl>
+                                          <p:spTgt spid="3">
+                                            <p:txEl>
+                                              <p:pRg st="0" end="0"/>
+                                            </p:txEl>
+                                          </p:spTgt>
+                                        </p:tgtEl>
+                                        <p:attrNameLst>
+                                          <p:attrName>style.visibility</p:attrName>
+                                        </p:attrNameLst>
+                                      </p:cBhvr>
+                                      <p:to>
+                                        <p:strVal val="visible"/>
+                                      </p:to>
+                                    </p:set>
+                                    <p:animEffect transition="in" filter="fade">
+                                      <p:cBhvr>
+                                        <p:cTn id="7" dur="500"/>
+                                        <p:tgtEl>
+                                          <p:spTgt spid="3">
+                                            <p:txEl>
+                                              <p:pRg st="0" end="0"/>
+                                            </p:txEl>
+                                          </p:spTgt>
+                                        </p:tgtEl>
+                                      </p:cBhvr>
+                                    </p:animEffect>
+                                  </p:childTnLst>
+                                </p:cTn>
+                              </p:par>
+                            </p:childTnLst>
+                          </p:cTn>
+                        </p:par>
+                      </p:childTnLst>
+                    </p:cTn>
+                  </p:par>
+                </p:childTnLst>
+              </p:cTn>
+              <p:prevCondLst>
+                <p:cond evt="onPrev" delay="0">
+                  <p:tgtEl>
+                    <p:sldTgt/>
+                  </p:tgtEl>
+                </p:cond>
+              </p:prevCondLst>
+              <p:nextCondLst>
+                <p:cond evt="onNext" delay="0">
+                  <p:tgtEl>
+                    <p:sldTgt/>
+                  </p:tgtEl>
+                </p:cond>
+              </p:nextCondLst>
+            </p:seq>
+          </p:childTnLst>
+        </p:cTn>
+      </p:par>
+    </p:tnLst>
+    <p:bldLst>
+      <p:bldP spid="3" grpId="0" build="p"/>
+    </p:bldLst>
+  </p:timing>
+</p:sld>
+</file>
+
+<file path=ppt/slides/slide13.xml><?xml version="1.0" encoding="utf-8"?>
+<p:sld xmlns:a="http://schemas.openxmlformats.org/drawingml/2006/main" xmlns:r="http://schemas.openxmlformats.org/officeDocument/2006/relationships" xmlns:p="http://schemas.openxmlformats.org/presentationml/2006/main">
+  <p:cSld>
+    <p:spTree>
+      <p:nvGrpSpPr>
+        <p:cNvPr id="1" name=""/>
+        <p:cNvGrpSpPr/>
+        <p:nvPr/>
+      </p:nvGrpSpPr>
+      <p:grpSpPr>
+        <a:xfrm>
+          <a:off x="0" y="0"/>
+          <a:ext cx="0" cy="0"/>
+          <a:chOff x="0" y="0"/>
+          <a:chExt cx="0" cy="0"/>
+        </a:xfrm>
+      </p:grpSpPr>
+      <p:sp>
+        <p:nvSpPr>
+          <p:cNvPr id="2" name="Title 1"/>
+          <p:cNvSpPr>
+            <a:spLocks noGrp="1"/>
+          </p:cNvSpPr>
+          <p:nvPr>
+            <p:ph type="title"/>
+          </p:nvPr>
+        </p:nvSpPr>
+        <p:spPr/>
+        <p:txBody>
+          <a:bodyPr/>
+          <a:lstStyle/>
+          <a:p>
+            <a:r>
+              <a:rPr lang="en-US" dirty="0" smtClean="0"/>
+              <a:t>Prepared Queries</a:t>
+            </a:r>
+            <a:endParaRPr lang="en-US" dirty="0"/>
+          </a:p>
+        </p:txBody>
+      </p:sp>
+      <p:sp>
+        <p:nvSpPr>
+          <p:cNvPr id="3" name="Content Placeholder 2"/>
+          <p:cNvSpPr>
+            <a:spLocks noGrp="1"/>
+          </p:cNvSpPr>
+          <p:nvPr>
+            <p:ph idx="1"/>
+          </p:nvPr>
+        </p:nvSpPr>
+        <p:spPr>
+          <a:xfrm>
+            <a:off x="457200" y="955193"/>
+            <a:ext cx="8007739" cy="3493655"/>
+          </a:xfrm>
+        </p:spPr>
+        <p:txBody>
+          <a:bodyPr/>
+          <a:lstStyle/>
+          <a:p>
+            <a:pPr>
+              <a:lnSpc>
+                <a:spcPct val="140000"/>
+              </a:lnSpc>
+            </a:pPr>
+            <a:endParaRPr lang="en-US" dirty="0" smtClean="0"/>
+          </a:p>
+        </p:txBody>
+      </p:sp>
+    </p:spTree>
+    <p:extLst>
+      <p:ext uri="{BB962C8B-B14F-4D97-AF65-F5344CB8AC3E}">
+        <p14:creationId xmlns:p14="http://schemas.microsoft.com/office/powerpoint/2010/main" val="2046168622"/>
+      </p:ext>
+    </p:extLst>
+  </p:cSld>
+  <p:clrMapOvr>
+    <a:masterClrMapping/>
+  </p:clrMapOvr>
+  <p:timing>
+    <p:tnLst>
+      <p:par>
+        <p:cTn xmlns:p14="http://schemas.microsoft.com/office/powerpoint/2010/main" id="1" dur="indefinite" restart="never" nodeType="tmRoot">
+          <p:childTnLst>
+            <p:seq concurrent="1" nextAc="seek">
+              <p:cTn id="2" dur="indefinite" nodeType="mainSeq">
+                <p:childTnLst>
+                  <p:par>
+                    <p:cTn id="3" fill="hold">
+                      <p:stCondLst>
+                        <p:cond delay="indefinite"/>
+                      </p:stCondLst>
+                      <p:childTnLst>
+                        <p:par>
+                          <p:cTn id="4" fill="hold">
+                            <p:stCondLst>
+                              <p:cond delay="0"/>
+                            </p:stCondLst>
+                            <p:childTnLst>
+                              <p:par>
+                                <p:cTn id="5" presetID="10" presetClass="entr" presetSubtype="0" fill="hold" grpId="0" nodeType="clickEffect" nodePh="1">
+                                  <p:stCondLst>
+                                    <p:cond delay="0"/>
+                                  </p:stCondLst>
+                                  <p:endCondLst>
+                                    <p:cond evt="begin" delay="0">
+                                      <p:tn val="5"/>
+                                    </p:cond>
+                                  </p:endCondLst>
+                                  <p:childTnLst>
+                                    <p:set>
+                                      <p:cBhvr>
+                                        <p:cTn id="6" dur="1" fill="hold">
+                                          <p:stCondLst>
+                                            <p:cond delay="0"/>
+                                          </p:stCondLst>
+                                        </p:cTn>
+                                        <p:tgtEl>
+                                          <p:spTgt spid="3">
+                                            <p:txEl>
+                                              <p:pRg st="0" end="0"/>
+                                            </p:txEl>
+                                          </p:spTgt>
+                                        </p:tgtEl>
+                                        <p:attrNameLst>
+                                          <p:attrName>style.visibility</p:attrName>
+                                        </p:attrNameLst>
+                                      </p:cBhvr>
+                                      <p:to>
+                                        <p:strVal val="visible"/>
+                                      </p:to>
+                                    </p:set>
+                                    <p:animEffect transition="in" filter="fade">
+                                      <p:cBhvr>
+                                        <p:cTn id="7" dur="500"/>
+                                        <p:tgtEl>
+                                          <p:spTgt spid="3">
+                                            <p:txEl>
+                                              <p:pRg st="0" end="0"/>
+                                            </p:txEl>
+                                          </p:spTgt>
+                                        </p:tgtEl>
+                                      </p:cBhvr>
+                                    </p:animEffect>
+                                  </p:childTnLst>
+                                </p:cTn>
+                              </p:par>
+                            </p:childTnLst>
+                          </p:cTn>
+                        </p:par>
+                      </p:childTnLst>
+                    </p:cTn>
+                  </p:par>
+                </p:childTnLst>
+              </p:cTn>
+              <p:prevCondLst>
+                <p:cond evt="onPrev" delay="0">
+                  <p:tgtEl>
+                    <p:sldTgt/>
+                  </p:tgtEl>
+                </p:cond>
+              </p:prevCondLst>
+              <p:nextCondLst>
+                <p:cond evt="onNext" delay="0">
+                  <p:tgtEl>
+                    <p:sldTgt/>
+                  </p:tgtEl>
+                </p:cond>
+              </p:nextCondLst>
+            </p:seq>
+          </p:childTnLst>
+        </p:cTn>
+      </p:par>
+    </p:tnLst>
+    <p:bldLst>
+      <p:bldP spid="3" grpId="0" build="p"/>
+    </p:bldLst>
+  </p:timing>
+</p:sld>
+</file>
+
+<file path=ppt/slides/slide14.xml><?xml version="1.0" encoding="utf-8"?>
+<p:sld xmlns:a="http://schemas.openxmlformats.org/drawingml/2006/main" xmlns:r="http://schemas.openxmlformats.org/officeDocument/2006/relationships" xmlns:p="http://schemas.openxmlformats.org/presentationml/2006/main">
+  <p:cSld>
+    <p:spTree>
+      <p:nvGrpSpPr>
+        <p:cNvPr id="1" name=""/>
+        <p:cNvGrpSpPr/>
+        <p:nvPr/>
+      </p:nvGrpSpPr>
+      <p:grpSpPr>
+        <a:xfrm>
+          <a:off x="0" y="0"/>
+          <a:ext cx="0" cy="0"/>
+          <a:chOff x="0" y="0"/>
+          <a:chExt cx="0" cy="0"/>
+        </a:xfrm>
+      </p:grpSpPr>
+      <p:sp>
+        <p:nvSpPr>
+          <p:cNvPr id="2" name="Title 1"/>
+          <p:cNvSpPr>
+            <a:spLocks noGrp="1"/>
+          </p:cNvSpPr>
+          <p:nvPr>
+            <p:ph type="ctrTitle"/>
+          </p:nvPr>
+        </p:nvSpPr>
+        <p:spPr/>
+        <p:txBody>
+          <a:bodyPr/>
+          <a:lstStyle/>
+          <a:p>
+            <a:r>
+              <a:rPr lang="en-US" dirty="0" smtClean="0"/>
+              <a:t>Advanced Queries - Java</a:t>
+            </a:r>
+            <a:endParaRPr lang="en-US" dirty="0"/>
+          </a:p>
+        </p:txBody>
+      </p:sp>
+    </p:spTree>
+    <p:extLst>
+      <p:ext uri="{BB962C8B-B14F-4D97-AF65-F5344CB8AC3E}">
+        <p14:creationId xmlns:p14="http://schemas.microsoft.com/office/powerpoint/2010/main" val="3683186877"/>
+      </p:ext>
+    </p:extLst>
+  </p:cSld>
+  <p:clrMapOvr>
+    <a:masterClrMapping/>
+  </p:clrMapOvr>
+  <p:timing>
+    <p:tnLst>
+      <p:par>
+        <p:cTn xmlns:p14="http://schemas.microsoft.com/office/powerpoint/2010/main" id="1" dur="indefinite" restart="never" nodeType="tmRoot"/>
+      </p:par>
+    </p:tnLst>
+  </p:timing>
+</p:sld>
+</file>
+
+<file path=ppt/slides/slide15.xml><?xml version="1.0" encoding="utf-8"?>
+<p:sld xmlns:a="http://schemas.openxmlformats.org/drawingml/2006/main" xmlns:r="http://schemas.openxmlformats.org/officeDocument/2006/relationships" xmlns:p="http://schemas.openxmlformats.org/presentationml/2006/main">
+  <p:cSld>
+    <p:spTree>
+      <p:nvGrpSpPr>
+        <p:cNvPr id="1" name=""/>
+        <p:cNvGrpSpPr/>
+        <p:nvPr/>
+      </p:nvGrpSpPr>
+      <p:grpSpPr>
+        <a:xfrm>
+          <a:off x="0" y="0"/>
+          <a:ext cx="0" cy="0"/>
+          <a:chOff x="0" y="0"/>
+          <a:chExt cx="0" cy="0"/>
+        </a:xfrm>
+      </p:grpSpPr>
+      <p:sp>
+        <p:nvSpPr>
+          <p:cNvPr id="2" name="Title 1"/>
+          <p:cNvSpPr>
+            <a:spLocks noGrp="1"/>
+          </p:cNvSpPr>
+          <p:nvPr>
+            <p:ph type="ctrTitle"/>
+          </p:nvPr>
+        </p:nvSpPr>
+        <p:spPr/>
+        <p:txBody>
+          <a:bodyPr/>
+          <a:lstStyle/>
+          <a:p>
+            <a:r>
+              <a:rPr lang="en-US" dirty="0"/>
+              <a:t>Advanced Queries - </a:t>
+            </a:r>
+            <a:r>
+              <a:rPr lang="en-US" dirty="0" smtClean="0"/>
+              <a:t>.NET</a:t>
+            </a:r>
+            <a:endParaRPr lang="en-US" dirty="0"/>
+          </a:p>
+        </p:txBody>
+      </p:sp>
+    </p:spTree>
+    <p:extLst>
+      <p:ext uri="{BB962C8B-B14F-4D97-AF65-F5344CB8AC3E}">
+        <p14:creationId xmlns:p14="http://schemas.microsoft.com/office/powerpoint/2010/main" val="882545490"/>
+      </p:ext>
+    </p:extLst>
+  </p:cSld>
+  <p:clrMapOvr>
+    <a:masterClrMapping/>
+  </p:clrMapOvr>
+  <p:timing>
+    <p:tnLst>
+      <p:par>
+        <p:cTn xmlns:p14="http://schemas.microsoft.com/office/powerpoint/2010/main" id="1" dur="indefinite" restart="never" nodeType="tmRoot"/>
+      </p:par>
+    </p:tnLst>
+  </p:timing>
+</p:sld>
+</file>
+
+<file path=ppt/slides/slide16.xml><?xml version="1.0" encoding="utf-8"?>
+<p:sld xmlns:a="http://schemas.openxmlformats.org/drawingml/2006/main" xmlns:r="http://schemas.openxmlformats.org/officeDocument/2006/relationships" xmlns:p="http://schemas.openxmlformats.org/presentationml/2006/main">
+  <p:cSld>
+    <p:spTree>
+      <p:nvGrpSpPr>
+        <p:cNvPr id="1" name=""/>
+        <p:cNvGrpSpPr/>
+        <p:nvPr/>
+      </p:nvGrpSpPr>
+      <p:grpSpPr>
+        <a:xfrm>
+          <a:off x="0" y="0"/>
+          <a:ext cx="0" cy="0"/>
+          <a:chOff x="0" y="0"/>
+          <a:chExt cx="0" cy="0"/>
+        </a:xfrm>
+      </p:grpSpPr>
+      <p:sp>
+        <p:nvSpPr>
+          <p:cNvPr id="2" name="Title 1"/>
+          <p:cNvSpPr>
+            <a:spLocks noGrp="1"/>
+          </p:cNvSpPr>
+          <p:nvPr>
+            <p:ph type="ctrTitle"/>
+          </p:nvPr>
+        </p:nvSpPr>
+        <p:spPr/>
+        <p:txBody>
+          <a:bodyPr/>
+          <a:lstStyle/>
+          <a:p>
+            <a:r>
+              <a:rPr lang="en-US" dirty="0"/>
+              <a:t>Advanced Queries - </a:t>
+            </a:r>
+            <a:r>
+              <a:rPr lang="en-US" dirty="0" err="1" smtClean="0"/>
+              <a:t>NodeJS</a:t>
+            </a:r>
+            <a:endParaRPr lang="en-US" dirty="0"/>
+          </a:p>
+        </p:txBody>
+      </p:sp>
+    </p:spTree>
+    <p:extLst>
+      <p:ext uri="{BB962C8B-B14F-4D97-AF65-F5344CB8AC3E}">
+        <p14:creationId xmlns:p14="http://schemas.microsoft.com/office/powerpoint/2010/main" val="3686523847"/>
+      </p:ext>
+    </p:extLst>
+  </p:cSld>
+  <p:clrMapOvr>
+    <a:masterClrMapping/>
+  </p:clrMapOvr>
+  <p:timing>
+    <p:tnLst>
+      <p:par>
+        <p:cTn xmlns:p14="http://schemas.microsoft.com/office/powerpoint/2010/main" id="1" dur="indefinite" restart="never" nodeType="tmRoot"/>
+      </p:par>
+    </p:tnLst>
+  </p:timing>
+</p:sld>
+</file>
+
+<file path=ppt/slides/slide17.xml><?xml version="1.0" encoding="utf-8"?>
+<p:sld xmlns:a="http://schemas.openxmlformats.org/drawingml/2006/main" xmlns:r="http://schemas.openxmlformats.org/officeDocument/2006/relationships" xmlns:p="http://schemas.openxmlformats.org/presentationml/2006/main">
+  <p:cSld>
+    <p:spTree>
+      <p:nvGrpSpPr>
+        <p:cNvPr id="1" name=""/>
+        <p:cNvGrpSpPr/>
+        <p:nvPr/>
+      </p:nvGrpSpPr>
+      <p:grpSpPr>
+        <a:xfrm>
+          <a:off x="0" y="0"/>
+          <a:ext cx="0" cy="0"/>
+          <a:chOff x="0" y="0"/>
+          <a:chExt cx="0" cy="0"/>
+        </a:xfrm>
+      </p:grpSpPr>
+      <p:sp>
+        <p:nvSpPr>
+          <p:cNvPr id="2" name="Title 1"/>
+          <p:cNvSpPr>
+            <a:spLocks noGrp="1"/>
+          </p:cNvSpPr>
+          <p:nvPr>
+            <p:ph type="ctrTitle"/>
+          </p:nvPr>
+        </p:nvSpPr>
+        <p:spPr/>
+        <p:txBody>
+          <a:bodyPr/>
+          <a:lstStyle/>
+          <a:p>
+            <a:r>
+              <a:rPr lang="en-US" dirty="0" smtClean="0"/>
+              <a:t>View vs. Indexes</a:t>
+            </a:r>
+            <a:endParaRPr lang="en-US" dirty="0"/>
+          </a:p>
+        </p:txBody>
+      </p:sp>
+    </p:spTree>
+    <p:extLst>
+      <p:ext uri="{BB962C8B-B14F-4D97-AF65-F5344CB8AC3E}">
+        <p14:creationId xmlns:p14="http://schemas.microsoft.com/office/powerpoint/2010/main" val="1029701812"/>
+      </p:ext>
+    </p:extLst>
+  </p:cSld>
+  <p:clrMapOvr>
+    <a:masterClrMapping/>
+  </p:clrMapOvr>
+  <p:timing>
+    <p:tnLst>
+      <p:par>
+        <p:cTn xmlns:p14="http://schemas.microsoft.com/office/powerpoint/2010/main" id="1" dur="indefinite" restart="never" nodeType="tmRoot"/>
+      </p:par>
+    </p:tnLst>
+  </p:timing>
+</p:sld>
+</file>
+
+<file path=ppt/slides/slide18.xml><?xml version="1.0" encoding="utf-8"?>
+<p:sld xmlns:a="http://schemas.openxmlformats.org/drawingml/2006/main" xmlns:r="http://schemas.openxmlformats.org/officeDocument/2006/relationships" xmlns:p="http://schemas.openxmlformats.org/presentationml/2006/main">
+  <p:cSld>
+    <p:spTree>
+      <p:nvGrpSpPr>
+        <p:cNvPr id="1" name=""/>
+        <p:cNvGrpSpPr/>
+        <p:nvPr/>
+      </p:nvGrpSpPr>
+      <p:grpSpPr>
+        <a:xfrm>
+          <a:off x="0" y="0"/>
+          <a:ext cx="0" cy="0"/>
+          <a:chOff x="0" y="0"/>
+          <a:chExt cx="0" cy="0"/>
+        </a:xfrm>
+      </p:grpSpPr>
+      <p:sp>
+        <p:nvSpPr>
+          <p:cNvPr id="2" name="Title 1"/>
+          <p:cNvSpPr>
+            <a:spLocks noGrp="1"/>
+          </p:cNvSpPr>
+          <p:nvPr>
+            <p:ph type="title"/>
+          </p:nvPr>
+        </p:nvSpPr>
+        <p:spPr/>
+        <p:txBody>
+          <a:bodyPr/>
+          <a:lstStyle/>
+          <a:p>
+            <a:r>
+              <a:rPr lang="en-US" dirty="0" smtClean="0"/>
+              <a:t>Views vs. Indexes</a:t>
+            </a:r>
+            <a:endParaRPr lang="en-US" dirty="0"/>
+          </a:p>
+        </p:txBody>
+      </p:sp>
+      <p:sp>
+        <p:nvSpPr>
+          <p:cNvPr id="4" name="Content Placeholder 3"/>
+          <p:cNvSpPr>
+            <a:spLocks noGrp="1"/>
+          </p:cNvSpPr>
+          <p:nvPr>
+            <p:ph idx="1"/>
+          </p:nvPr>
+        </p:nvSpPr>
+        <p:spPr/>
+        <p:txBody>
+          <a:bodyPr/>
+          <a:lstStyle/>
+          <a:p>
+            <a:r>
+              <a:rPr lang="en-US" b="1" dirty="0" smtClean="0"/>
+              <a:t>Global Secondary Indexes vs. Views</a:t>
+            </a:r>
+          </a:p>
+          <a:p>
+            <a:pPr lvl="1"/>
+            <a:r>
+              <a:rPr lang="en-US" b="1" dirty="0" smtClean="0"/>
+              <a:t>GSI – Index Service</a:t>
+            </a:r>
+          </a:p>
+          <a:p>
+            <a:pPr marL="230188" lvl="1" indent="0">
+              <a:buNone/>
+            </a:pPr>
+            <a:r>
+              <a:rPr lang="en-US" dirty="0" smtClean="0"/>
+              <a:t>Global Secondary Indexes is a new indexing technology that allows independently partitioned and independently scalable indexes. </a:t>
+            </a:r>
+          </a:p>
+          <a:p>
+            <a:pPr lvl="1"/>
+            <a:endParaRPr lang="en-US" b="1" dirty="0" smtClean="0"/>
+          </a:p>
+          <a:p>
+            <a:pPr lvl="1"/>
+            <a:r>
+              <a:rPr lang="en-US" b="1" dirty="0" smtClean="0"/>
+              <a:t>Views – Data Service</a:t>
+            </a:r>
+          </a:p>
+          <a:p>
+            <a:pPr marL="230188" lvl="1" indent="0">
+              <a:buNone/>
+            </a:pPr>
+            <a:r>
+              <a:rPr lang="en-US" dirty="0" smtClean="0"/>
+              <a:t>Incremental Map/Reduce Views that provide full partition alignment and paired scalability with Data Service. </a:t>
+            </a:r>
+          </a:p>
+        </p:txBody>
+      </p:sp>
+      <p:sp>
+        <p:nvSpPr>
+          <p:cNvPr id="8" name="TextBox 7"/>
+          <p:cNvSpPr txBox="1"/>
+          <p:nvPr/>
+        </p:nvSpPr>
+        <p:spPr>
+          <a:xfrm>
+            <a:off x="7130590" y="4054833"/>
+            <a:ext cx="1186330" cy="369332"/>
+          </a:xfrm>
+          <a:prstGeom prst="rect">
+            <a:avLst/>
+          </a:prstGeom>
+          <a:noFill/>
+        </p:spPr>
+        <p:txBody>
+          <a:bodyPr wrap="none" rtlCol="0">
+            <a:spAutoFit/>
+          </a:bodyPr>
+          <a:lstStyle/>
+          <a:p>
+            <a:r>
+              <a:rPr lang="en-US" sz="1800" dirty="0" smtClean="0"/>
+              <a:t>Index Scan</a:t>
+            </a:r>
+            <a:endParaRPr lang="en-US" sz="1800" dirty="0"/>
+          </a:p>
+        </p:txBody>
+      </p:sp>
+      <p:pic>
+        <p:nvPicPr>
+          <p:cNvPr id="9" name="Picture 8"/>
+          <p:cNvPicPr>
+            <a:picLocks noChangeAspect="1"/>
+          </p:cNvPicPr>
+          <p:nvPr/>
+        </p:nvPicPr>
+        <p:blipFill>
+          <a:blip r:embed="rId2"/>
+          <a:stretch>
+            <a:fillRect/>
+          </a:stretch>
+        </p:blipFill>
+        <p:spPr>
+          <a:xfrm>
+            <a:off x="5726313" y="3431945"/>
+            <a:ext cx="3318322" cy="1711555"/>
+          </a:xfrm>
+          <a:prstGeom prst="rect">
+            <a:avLst/>
+          </a:prstGeom>
+        </p:spPr>
+      </p:pic>
+      <p:sp>
+        <p:nvSpPr>
+          <p:cNvPr id="11" name="Rectangle 10"/>
+          <p:cNvSpPr/>
+          <p:nvPr/>
+        </p:nvSpPr>
+        <p:spPr>
+          <a:xfrm flipH="1" flipV="1">
+            <a:off x="6802863" y="3812639"/>
+            <a:ext cx="1027580" cy="1213152"/>
+          </a:xfrm>
+          <a:prstGeom prst="rect">
+            <a:avLst/>
+          </a:prstGeom>
+          <a:solidFill>
+            <a:schemeClr val="accent1">
+              <a:alpha val="26000"/>
+            </a:schemeClr>
+          </a:solidFill>
+        </p:spPr>
+        <p:style>
+          <a:lnRef idx="1">
+            <a:schemeClr val="accent1"/>
+          </a:lnRef>
+          <a:fillRef idx="3">
+            <a:schemeClr val="accent1"/>
+          </a:fillRef>
+          <a:effectRef idx="2">
+            <a:schemeClr val="accent1"/>
+          </a:effectRef>
+          <a:fontRef idx="minor">
+            <a:schemeClr val="lt1"/>
+          </a:fontRef>
+        </p:style>
+        <p:txBody>
+          <a:bodyPr rtlCol="0" anchor="ctr"/>
+          <a:lstStyle/>
+          <a:p>
+            <a:endParaRPr lang="en-US" sz="2400" dirty="0"/>
+          </a:p>
+        </p:txBody>
+      </p:sp>
+      <p:sp>
+        <p:nvSpPr>
+          <p:cNvPr id="12" name="Rectangle 11"/>
+          <p:cNvSpPr/>
+          <p:nvPr/>
+        </p:nvSpPr>
+        <p:spPr>
+          <a:xfrm>
+            <a:off x="5726313" y="3812639"/>
+            <a:ext cx="1076550" cy="1208547"/>
+          </a:xfrm>
+          <a:prstGeom prst="rect">
+            <a:avLst/>
+          </a:prstGeom>
+          <a:solidFill>
+            <a:schemeClr val="accent5">
+              <a:alpha val="26000"/>
+            </a:schemeClr>
+          </a:solidFill>
+        </p:spPr>
+        <p:style>
+          <a:lnRef idx="1">
+            <a:schemeClr val="accent1"/>
+          </a:lnRef>
+          <a:fillRef idx="3">
+            <a:schemeClr val="accent1"/>
+          </a:fillRef>
+          <a:effectRef idx="2">
+            <a:schemeClr val="accent1"/>
+          </a:effectRef>
+          <a:fontRef idx="minor">
+            <a:schemeClr val="lt1"/>
+          </a:fontRef>
+        </p:style>
+        <p:txBody>
+          <a:bodyPr rtlCol="0" anchor="ctr"/>
+          <a:lstStyle/>
+          <a:p>
+            <a:endParaRPr lang="en-US" sz="2400" dirty="0"/>
+          </a:p>
+        </p:txBody>
+      </p:sp>
+      <p:cxnSp>
+        <p:nvCxnSpPr>
+          <p:cNvPr id="22" name="Elbow Connector 21"/>
+          <p:cNvCxnSpPr>
+            <a:endCxn id="12" idx="0"/>
+          </p:cNvCxnSpPr>
+          <p:nvPr/>
+        </p:nvCxnSpPr>
+        <p:spPr>
+          <a:xfrm>
+            <a:off x="4662883" y="3251962"/>
+            <a:ext cx="1601705" cy="560677"/>
+          </a:xfrm>
+          <a:prstGeom prst="bentConnector2">
+            <a:avLst/>
+          </a:prstGeom>
+          <a:ln w="12700" cmpd="sng">
+            <a:solidFill>
+              <a:srgbClr val="609E0E"/>
+            </a:solidFill>
+          </a:ln>
+          <a:effectLst/>
+        </p:spPr>
+        <p:style>
+          <a:lnRef idx="2">
+            <a:schemeClr val="accent1"/>
+          </a:lnRef>
+          <a:fillRef idx="0">
+            <a:schemeClr val="accent1"/>
+          </a:fillRef>
+          <a:effectRef idx="1">
+            <a:schemeClr val="accent1"/>
+          </a:effectRef>
+          <a:fontRef idx="minor">
+            <a:schemeClr val="tx1"/>
+          </a:fontRef>
+        </p:style>
+      </p:cxnSp>
+      <p:sp>
+        <p:nvSpPr>
+          <p:cNvPr id="23" name="Freeform 22"/>
+          <p:cNvSpPr/>
+          <p:nvPr/>
+        </p:nvSpPr>
+        <p:spPr>
+          <a:xfrm>
+            <a:off x="7280301" y="1939114"/>
+            <a:ext cx="1289321" cy="1880941"/>
+          </a:xfrm>
+          <a:custGeom>
+            <a:avLst/>
+            <a:gdLst>
+              <a:gd name="connsiteX0" fmla="*/ 145412 w 1289321"/>
+              <a:gd name="connsiteY0" fmla="*/ 9696 h 1880941"/>
+              <a:gd name="connsiteX1" fmla="*/ 1289321 w 1289321"/>
+              <a:gd name="connsiteY1" fmla="*/ 9696 h 1880941"/>
+              <a:gd name="connsiteX2" fmla="*/ 1260239 w 1289321"/>
+              <a:gd name="connsiteY2" fmla="*/ 1299206 h 1880941"/>
+              <a:gd name="connsiteX3" fmla="*/ 0 w 1289321"/>
+              <a:gd name="connsiteY3" fmla="*/ 1299206 h 1880941"/>
+              <a:gd name="connsiteX4" fmla="*/ 0 w 1289321"/>
+              <a:gd name="connsiteY4" fmla="*/ 1880941 h 1880941"/>
+              <a:gd name="connsiteX5" fmla="*/ 9694 w 1289321"/>
+              <a:gd name="connsiteY5" fmla="*/ 1289511 h 1880941"/>
+              <a:gd name="connsiteX6" fmla="*/ 1250544 w 1289321"/>
+              <a:gd name="connsiteY6" fmla="*/ 1289511 h 1880941"/>
+              <a:gd name="connsiteX7" fmla="*/ 1269933 w 1289321"/>
+              <a:gd name="connsiteY7" fmla="*/ 0 h 1880941"/>
+              <a:gd name="connsiteX8" fmla="*/ 145412 w 1289321"/>
+              <a:gd name="connsiteY8" fmla="*/ 9696 h 1880941"/>
+            </a:gdLst>
+            <a:ahLst/>
+            <a:cxnLst>
+              <a:cxn ang="0">
+                <a:pos x="connsiteX0" y="connsiteY0"/>
+              </a:cxn>
+              <a:cxn ang="0">
+                <a:pos x="connsiteX1" y="connsiteY1"/>
+              </a:cxn>
+              <a:cxn ang="0">
+                <a:pos x="connsiteX2" y="connsiteY2"/>
+              </a:cxn>
+              <a:cxn ang="0">
+                <a:pos x="connsiteX3" y="connsiteY3"/>
+              </a:cxn>
+              <a:cxn ang="0">
+                <a:pos x="connsiteX4" y="connsiteY4"/>
+              </a:cxn>
+              <a:cxn ang="0">
+                <a:pos x="connsiteX5" y="connsiteY5"/>
+              </a:cxn>
+              <a:cxn ang="0">
+                <a:pos x="connsiteX6" y="connsiteY6"/>
+              </a:cxn>
+              <a:cxn ang="0">
+                <a:pos x="connsiteX7" y="connsiteY7"/>
+              </a:cxn>
+              <a:cxn ang="0">
+                <a:pos x="connsiteX8" y="connsiteY8"/>
+              </a:cxn>
+            </a:cxnLst>
+            <a:rect l="l" t="t" r="r" b="b"/>
+            <a:pathLst>
+              <a:path w="1289321" h="1880941">
+                <a:moveTo>
+                  <a:pt x="145412" y="9696"/>
+                </a:moveTo>
+                <a:lnTo>
+                  <a:pt x="1289321" y="9696"/>
+                </a:lnTo>
+                <a:lnTo>
+                  <a:pt x="1260239" y="1299206"/>
+                </a:lnTo>
+                <a:lnTo>
+                  <a:pt x="0" y="1299206"/>
+                </a:lnTo>
+                <a:lnTo>
+                  <a:pt x="0" y="1880941"/>
+                </a:lnTo>
+                <a:lnTo>
+                  <a:pt x="9694" y="1289511"/>
+                </a:lnTo>
+                <a:lnTo>
+                  <a:pt x="1250544" y="1289511"/>
+                </a:lnTo>
+                <a:lnTo>
+                  <a:pt x="1269933" y="0"/>
+                </a:lnTo>
+                <a:lnTo>
+                  <a:pt x="145412" y="9696"/>
+                </a:lnTo>
+                <a:close/>
+              </a:path>
+            </a:pathLst>
+          </a:custGeom>
+        </p:spPr>
+        <p:style>
+          <a:lnRef idx="1">
+            <a:schemeClr val="accent1"/>
+          </a:lnRef>
+          <a:fillRef idx="3">
+            <a:schemeClr val="accent1"/>
+          </a:fillRef>
+          <a:effectRef idx="2">
+            <a:schemeClr val="accent1"/>
+          </a:effectRef>
+          <a:fontRef idx="minor">
+            <a:schemeClr val="lt1"/>
+          </a:fontRef>
+        </p:style>
+        <p:txBody>
+          <a:bodyPr rtlCol="0" anchor="ctr"/>
+          <a:lstStyle/>
+          <a:p>
+            <a:pPr algn="ctr"/>
+            <a:endParaRPr lang="en-US"/>
+          </a:p>
+        </p:txBody>
+      </p:sp>
+    </p:spTree>
+    <p:extLst>
+      <p:ext uri="{BB962C8B-B14F-4D97-AF65-F5344CB8AC3E}">
+        <p14:creationId xmlns:p14="http://schemas.microsoft.com/office/powerpoint/2010/main" val="2651426066"/>
+      </p:ext>
+    </p:extLst>
+  </p:cSld>
+  <p:clrMapOvr>
+    <a:masterClrMapping/>
+  </p:clrMapOvr>
+  <p:timing>
+    <p:tnLst>
+      <p:par>
+        <p:cTn xmlns:p14="http://schemas.microsoft.com/office/powerpoint/2010/main" id="1" dur="indefinite" restart="never" nodeType="tmRoot"/>
+      </p:par>
+    </p:tnLst>
+  </p:timing>
+</p:sld>
+</file>
+
+<file path=ppt/slides/slide19.xml><?xml version="1.0" encoding="utf-8"?>
+<p:sld xmlns:a="http://schemas.openxmlformats.org/drawingml/2006/main" xmlns:r="http://schemas.openxmlformats.org/officeDocument/2006/relationships" xmlns:p="http://schemas.openxmlformats.org/presentationml/2006/main">
+  <p:cSld>
+    <p:spTree>
+      <p:nvGrpSpPr>
+        <p:cNvPr id="1" name=""/>
+        <p:cNvGrpSpPr/>
+        <p:nvPr/>
+      </p:nvGrpSpPr>
+      <p:grpSpPr>
+        <a:xfrm>
+          <a:off x="0" y="0"/>
+          <a:ext cx="0" cy="0"/>
+          <a:chOff x="0" y="0"/>
+          <a:chExt cx="0" cy="0"/>
+        </a:xfrm>
+      </p:grpSpPr>
+      <p:sp>
+        <p:nvSpPr>
           <p:cNvPr id="27668" name="Oval 20"/>
           <p:cNvSpPr>
             <a:spLocks/>
@@ -5163,7 +6438,7 @@
             <a:fld id="{2066355A-084C-D24E-9AD2-7E4FC41EA627}" type="slidenum">
               <a:rPr lang="en-US" smtClean="0"/>
               <a:pPr/>
-              <a:t>10</a:t>
+              <a:t>19</a:t>
             </a:fld>
             <a:endParaRPr lang="en-US" dirty="0"/>
           </a:p>
@@ -8787,7 +10062,67 @@
 </p:sld>
 </file>
 
-<file path=ppt/slides/slide11.xml><?xml version="1.0" encoding="utf-8"?>
+<file path=ppt/slides/slide2.xml><?xml version="1.0" encoding="utf-8"?>
+<p:sld xmlns:a="http://schemas.openxmlformats.org/drawingml/2006/main" xmlns:r="http://schemas.openxmlformats.org/officeDocument/2006/relationships" xmlns:p="http://schemas.openxmlformats.org/presentationml/2006/main">
+  <p:cSld>
+    <p:spTree>
+      <p:nvGrpSpPr>
+        <p:cNvPr id="1" name=""/>
+        <p:cNvGrpSpPr/>
+        <p:nvPr/>
+      </p:nvGrpSpPr>
+      <p:grpSpPr>
+        <a:xfrm>
+          <a:off x="0" y="0"/>
+          <a:ext cx="0" cy="0"/>
+          <a:chOff x="0" y="0"/>
+          <a:chExt cx="0" cy="0"/>
+        </a:xfrm>
+      </p:grpSpPr>
+      <p:sp>
+        <p:nvSpPr>
+          <p:cNvPr id="2" name="Title 1"/>
+          <p:cNvSpPr>
+            <a:spLocks noGrp="1"/>
+          </p:cNvSpPr>
+          <p:nvPr>
+            <p:ph type="ctrTitle"/>
+          </p:nvPr>
+        </p:nvSpPr>
+        <p:spPr/>
+        <p:txBody>
+          <a:bodyPr/>
+          <a:lstStyle/>
+          <a:p>
+            <a:r>
+              <a:rPr lang="en-US" dirty="0" smtClean="0"/>
+              <a:t>Index Management</a:t>
+            </a:r>
+            <a:endParaRPr lang="en-US" dirty="0"/>
+          </a:p>
+        </p:txBody>
+      </p:sp>
+    </p:spTree>
+    <p:extLst>
+      <p:ext uri="{BB962C8B-B14F-4D97-AF65-F5344CB8AC3E}">
+        <p14:creationId xmlns:p14="http://schemas.microsoft.com/office/powerpoint/2010/main" val="735871736"/>
+      </p:ext>
+    </p:extLst>
+  </p:cSld>
+  <p:clrMapOvr>
+    <a:masterClrMapping/>
+  </p:clrMapOvr>
+  <p:timing>
+    <p:tnLst>
+      <p:par>
+        <p:cTn xmlns:p14="http://schemas.microsoft.com/office/powerpoint/2010/main" id="1" dur="indefinite" restart="never" nodeType="tmRoot"/>
+      </p:par>
+    </p:tnLst>
+  </p:timing>
+</p:sld>
+</file>
+
+<file path=ppt/slides/slide20.xml><?xml version="1.0" encoding="utf-8"?>
 <p:sld xmlns:a="http://schemas.openxmlformats.org/drawingml/2006/main" xmlns:r="http://schemas.openxmlformats.org/officeDocument/2006/relationships" xmlns:p="http://schemas.openxmlformats.org/presentationml/2006/main">
   <p:cSld>
     <p:spTree>
@@ -10714,7 +12049,7 @@
 </p:sld>
 </file>
 
-<file path=ppt/slides/slide12.xml><?xml version="1.0" encoding="utf-8"?>
+<file path=ppt/slides/slide21.xml><?xml version="1.0" encoding="utf-8"?>
 <p:sld xmlns:a="http://schemas.openxmlformats.org/drawingml/2006/main" xmlns:r="http://schemas.openxmlformats.org/officeDocument/2006/relationships" xmlns:p="http://schemas.openxmlformats.org/presentationml/2006/main">
   <p:cSld>
     <p:spTree>
@@ -11423,7 +12758,7 @@
 </p:sld>
 </file>
 
-<file path=ppt/slides/slide13.xml><?xml version="1.0" encoding="utf-8"?>
+<file path=ppt/slides/slide22.xml><?xml version="1.0" encoding="utf-8"?>
 <p:sld xmlns:a="http://schemas.openxmlformats.org/drawingml/2006/main" xmlns:r="http://schemas.openxmlformats.org/officeDocument/2006/relationships" xmlns:p="http://schemas.openxmlformats.org/presentationml/2006/main">
   <p:cSld>
     <p:spTree>
@@ -11502,7 +12837,7 @@
 </p:sld>
 </file>
 
-<file path=ppt/slides/slide14.xml><?xml version="1.0" encoding="utf-8"?>
+<file path=ppt/slides/slide23.xml><?xml version="1.0" encoding="utf-8"?>
 <p:sld xmlns:a="http://schemas.openxmlformats.org/drawingml/2006/main" xmlns:r="http://schemas.openxmlformats.org/officeDocument/2006/relationships" xmlns:p="http://schemas.openxmlformats.org/presentationml/2006/main">
   <p:cSld>
     <p:spTree>
@@ -11562,7 +12897,7 @@
 </p:sld>
 </file>
 
-<file path=ppt/slides/slide15.xml><?xml version="1.0" encoding="utf-8"?>
+<file path=ppt/slides/slide24.xml><?xml version="1.0" encoding="utf-8"?>
 <p:sld xmlns:a="http://schemas.openxmlformats.org/drawingml/2006/main" xmlns:r="http://schemas.openxmlformats.org/officeDocument/2006/relationships" xmlns:p="http://schemas.openxmlformats.org/presentationml/2006/main" show="0">
   <p:cSld>
     <p:spTree>
@@ -11681,7 +13016,7 @@
 </p:sld>
 </file>
 
-<file path=ppt/slides/slide16.xml><?xml version="1.0" encoding="utf-8"?>
+<file path=ppt/slides/slide25.xml><?xml version="1.0" encoding="utf-8"?>
 <p:sld xmlns:a="http://schemas.openxmlformats.org/drawingml/2006/main" xmlns:r="http://schemas.openxmlformats.org/officeDocument/2006/relationships" xmlns:p="http://schemas.openxmlformats.org/presentationml/2006/main" show="0">
   <p:cSld>
     <p:spTree>
@@ -11930,7 +13265,7 @@
 </p:sld>
 </file>
 
-<file path=ppt/slides/slide17.xml><?xml version="1.0" encoding="utf-8"?>
+<file path=ppt/slides/slide26.xml><?xml version="1.0" encoding="utf-8"?>
 <p:sld xmlns:a="http://schemas.openxmlformats.org/drawingml/2006/main" xmlns:r="http://schemas.openxmlformats.org/officeDocument/2006/relationships" xmlns:p="http://schemas.openxmlformats.org/presentationml/2006/main" show="0">
   <p:cSld>
     <p:spTree>
@@ -11998,7 +13333,7 @@
 </p:sld>
 </file>
 
-<file path=ppt/slides/slide18.xml><?xml version="1.0" encoding="utf-8"?>
+<file path=ppt/slides/slide27.xml><?xml version="1.0" encoding="utf-8"?>
 <p:sld xmlns:a="http://schemas.openxmlformats.org/drawingml/2006/main" xmlns:r="http://schemas.openxmlformats.org/officeDocument/2006/relationships" xmlns:p="http://schemas.openxmlformats.org/presentationml/2006/main" show="0">
   <p:cSld>
     <p:spTree>
@@ -12089,7 +13424,7 @@
 </p:sld>
 </file>
 
-<file path=ppt/slides/slide19.xml><?xml version="1.0" encoding="utf-8"?>
+<file path=ppt/slides/slide28.xml><?xml version="1.0" encoding="utf-8"?>
 <p:sld xmlns:a="http://schemas.openxmlformats.org/drawingml/2006/main" xmlns:r="http://schemas.openxmlformats.org/officeDocument/2006/relationships" xmlns:p="http://schemas.openxmlformats.org/presentationml/2006/main" show="0">
   <p:cSld>
     <p:spTree>
@@ -13711,67 +15046,7 @@
 </p:sld>
 </file>
 
-<file path=ppt/slides/slide2.xml><?xml version="1.0" encoding="utf-8"?>
-<p:sld xmlns:a="http://schemas.openxmlformats.org/drawingml/2006/main" xmlns:r="http://schemas.openxmlformats.org/officeDocument/2006/relationships" xmlns:p="http://schemas.openxmlformats.org/presentationml/2006/main">
-  <p:cSld>
-    <p:spTree>
-      <p:nvGrpSpPr>
-        <p:cNvPr id="1" name=""/>
-        <p:cNvGrpSpPr/>
-        <p:nvPr/>
-      </p:nvGrpSpPr>
-      <p:grpSpPr>
-        <a:xfrm>
-          <a:off x="0" y="0"/>
-          <a:ext cx="0" cy="0"/>
-          <a:chOff x="0" y="0"/>
-          <a:chExt cx="0" cy="0"/>
-        </a:xfrm>
-      </p:grpSpPr>
-      <p:sp>
-        <p:nvSpPr>
-          <p:cNvPr id="2" name="Title 1"/>
-          <p:cNvSpPr>
-            <a:spLocks noGrp="1"/>
-          </p:cNvSpPr>
-          <p:nvPr>
-            <p:ph type="ctrTitle"/>
-          </p:nvPr>
-        </p:nvSpPr>
-        <p:spPr/>
-        <p:txBody>
-          <a:bodyPr/>
-          <a:lstStyle/>
-          <a:p>
-            <a:r>
-              <a:rPr lang="en-US" dirty="0" smtClean="0"/>
-              <a:t>Index Management</a:t>
-            </a:r>
-            <a:endParaRPr lang="en-US" dirty="0"/>
-          </a:p>
-        </p:txBody>
-      </p:sp>
-    </p:spTree>
-    <p:extLst>
-      <p:ext uri="{BB962C8B-B14F-4D97-AF65-F5344CB8AC3E}">
-        <p14:creationId xmlns:p14="http://schemas.microsoft.com/office/powerpoint/2010/main" val="735871736"/>
-      </p:ext>
-    </p:extLst>
-  </p:cSld>
-  <p:clrMapOvr>
-    <a:masterClrMapping/>
-  </p:clrMapOvr>
-  <p:timing>
-    <p:tnLst>
-      <p:par>
-        <p:cTn xmlns:p14="http://schemas.microsoft.com/office/powerpoint/2010/main" id="1" dur="indefinite" restart="never" nodeType="tmRoot"/>
-      </p:par>
-    </p:tnLst>
-  </p:timing>
-</p:sld>
-</file>
-
-<file path=ppt/slides/slide20.xml><?xml version="1.0" encoding="utf-8"?>
+<file path=ppt/slides/slide29.xml><?xml version="1.0" encoding="utf-8"?>
 <p:sld xmlns:a="http://schemas.openxmlformats.org/drawingml/2006/main" xmlns:r="http://schemas.openxmlformats.org/officeDocument/2006/relationships" xmlns:p="http://schemas.openxmlformats.org/presentationml/2006/main" show="0">
   <p:cSld>
     <p:spTree>
@@ -14523,7 +15798,426 @@
 </p:sld>
 </file>
 
-<file path=ppt/slides/slide21.xml><?xml version="1.0" encoding="utf-8"?>
+<file path=ppt/slides/slide3.xml><?xml version="1.0" encoding="utf-8"?>
+<p:sld xmlns:a="http://schemas.openxmlformats.org/drawingml/2006/main" xmlns:r="http://schemas.openxmlformats.org/officeDocument/2006/relationships" xmlns:p="http://schemas.openxmlformats.org/presentationml/2006/main">
+  <p:cSld>
+    <p:spTree>
+      <p:nvGrpSpPr>
+        <p:cNvPr id="1" name=""/>
+        <p:cNvGrpSpPr/>
+        <p:nvPr/>
+      </p:nvGrpSpPr>
+      <p:grpSpPr>
+        <a:xfrm>
+          <a:off x="0" y="0"/>
+          <a:ext cx="0" cy="0"/>
+          <a:chOff x="0" y="0"/>
+          <a:chExt cx="0" cy="0"/>
+        </a:xfrm>
+      </p:grpSpPr>
+      <p:sp>
+        <p:nvSpPr>
+          <p:cNvPr id="2" name="Title 1"/>
+          <p:cNvSpPr>
+            <a:spLocks noGrp="1"/>
+          </p:cNvSpPr>
+          <p:nvPr>
+            <p:ph type="title"/>
+          </p:nvPr>
+        </p:nvSpPr>
+        <p:spPr/>
+        <p:txBody>
+          <a:bodyPr/>
+          <a:lstStyle/>
+          <a:p>
+            <a:r>
+              <a:rPr lang="en-US" dirty="0" smtClean="0"/>
+              <a:t>Secondary Indexes</a:t>
+            </a:r>
+            <a:endParaRPr lang="en-US" dirty="0"/>
+          </a:p>
+        </p:txBody>
+      </p:sp>
+      <p:sp>
+        <p:nvSpPr>
+          <p:cNvPr id="3" name="Content Placeholder 2"/>
+          <p:cNvSpPr>
+            <a:spLocks noGrp="1"/>
+          </p:cNvSpPr>
+          <p:nvPr>
+            <p:ph idx="1"/>
+          </p:nvPr>
+        </p:nvSpPr>
+        <p:spPr>
+          <a:xfrm>
+            <a:off x="457200" y="955193"/>
+            <a:ext cx="8007739" cy="3493655"/>
+          </a:xfrm>
+        </p:spPr>
+        <p:txBody>
+          <a:bodyPr/>
+          <a:lstStyle/>
+          <a:p>
+            <a:pPr>
+              <a:lnSpc>
+                <a:spcPct val="140000"/>
+              </a:lnSpc>
+            </a:pPr>
+            <a:r>
+              <a:rPr lang="en-US" dirty="0" smtClean="0"/>
+              <a:t>Are the backing data structure for N1QL</a:t>
+            </a:r>
+            <a:endParaRPr lang="en-US" dirty="0" smtClean="0"/>
+          </a:p>
+          <a:p>
+            <a:pPr>
+              <a:lnSpc>
+                <a:spcPct val="140000"/>
+              </a:lnSpc>
+            </a:pPr>
+            <a:r>
+              <a:rPr lang="en-US" dirty="0" smtClean="0"/>
+              <a:t>Optimize the data lookup path for the query </a:t>
+            </a:r>
+            <a:r>
+              <a:rPr lang="en-US" dirty="0" smtClean="0"/>
+              <a:t>engine (“avoiding the full table scan”)</a:t>
+            </a:r>
+            <a:endParaRPr lang="en-US" dirty="0" smtClean="0"/>
+          </a:p>
+          <a:p>
+            <a:pPr>
+              <a:lnSpc>
+                <a:spcPct val="140000"/>
+              </a:lnSpc>
+            </a:pPr>
+            <a:r>
+              <a:rPr lang="en-US" dirty="0" smtClean="0"/>
+              <a:t>Two types of indexes</a:t>
+            </a:r>
+          </a:p>
+          <a:p>
+            <a:pPr lvl="1">
+              <a:lnSpc>
+                <a:spcPct val="140000"/>
+              </a:lnSpc>
+            </a:pPr>
+            <a:r>
+              <a:rPr lang="en-US" dirty="0" smtClean="0"/>
+              <a:t>View indexes</a:t>
+            </a:r>
+          </a:p>
+          <a:p>
+            <a:pPr lvl="1">
+              <a:lnSpc>
+                <a:spcPct val="140000"/>
+              </a:lnSpc>
+            </a:pPr>
+            <a:r>
+              <a:rPr lang="en-US" dirty="0" smtClean="0"/>
+              <a:t>GSI indexes (new global secondary indexes)</a:t>
+            </a:r>
+          </a:p>
+        </p:txBody>
+      </p:sp>
+    </p:spTree>
+    <p:extLst>
+      <p:ext uri="{BB962C8B-B14F-4D97-AF65-F5344CB8AC3E}">
+        <p14:creationId xmlns:p14="http://schemas.microsoft.com/office/powerpoint/2010/main" val="230402553"/>
+      </p:ext>
+    </p:extLst>
+  </p:cSld>
+  <p:clrMapOvr>
+    <a:masterClrMapping/>
+  </p:clrMapOvr>
+  <p:timing>
+    <p:tnLst>
+      <p:par>
+        <p:cTn xmlns:p14="http://schemas.microsoft.com/office/powerpoint/2010/main" id="1" dur="indefinite" restart="never" nodeType="tmRoot">
+          <p:childTnLst>
+            <p:seq concurrent="1" nextAc="seek">
+              <p:cTn id="2" dur="indefinite" nodeType="mainSeq">
+                <p:childTnLst>
+                  <p:par>
+                    <p:cTn id="3" fill="hold">
+                      <p:stCondLst>
+                        <p:cond delay="indefinite"/>
+                      </p:stCondLst>
+                      <p:childTnLst>
+                        <p:par>
+                          <p:cTn id="4" fill="hold">
+                            <p:stCondLst>
+                              <p:cond delay="0"/>
+                            </p:stCondLst>
+                            <p:childTnLst>
+                              <p:par>
+                                <p:cTn id="5" presetID="10" presetClass="entr" presetSubtype="0" fill="hold" grpId="0" nodeType="clickEffect">
+                                  <p:stCondLst>
+                                    <p:cond delay="0"/>
+                                  </p:stCondLst>
+                                  <p:childTnLst>
+                                    <p:set>
+                                      <p:cBhvr>
+                                        <p:cTn id="6" dur="1" fill="hold">
+                                          <p:stCondLst>
+                                            <p:cond delay="0"/>
+                                          </p:stCondLst>
+                                        </p:cTn>
+                                        <p:tgtEl>
+                                          <p:spTgt spid="3">
+                                            <p:txEl>
+                                              <p:pRg st="0" end="0"/>
+                                            </p:txEl>
+                                          </p:spTgt>
+                                        </p:tgtEl>
+                                        <p:attrNameLst>
+                                          <p:attrName>style.visibility</p:attrName>
+                                        </p:attrNameLst>
+                                      </p:cBhvr>
+                                      <p:to>
+                                        <p:strVal val="visible"/>
+                                      </p:to>
+                                    </p:set>
+                                    <p:animEffect transition="in" filter="fade">
+                                      <p:cBhvr>
+                                        <p:cTn id="7" dur="500"/>
+                                        <p:tgtEl>
+                                          <p:spTgt spid="3">
+                                            <p:txEl>
+                                              <p:pRg st="0" end="0"/>
+                                            </p:txEl>
+                                          </p:spTgt>
+                                        </p:tgtEl>
+                                      </p:cBhvr>
+                                    </p:animEffect>
+                                  </p:childTnLst>
+                                </p:cTn>
+                              </p:par>
+                            </p:childTnLst>
+                          </p:cTn>
+                        </p:par>
+                      </p:childTnLst>
+                    </p:cTn>
+                  </p:par>
+                  <p:par>
+                    <p:cTn id="8" fill="hold">
+                      <p:stCondLst>
+                        <p:cond delay="indefinite"/>
+                      </p:stCondLst>
+                      <p:childTnLst>
+                        <p:par>
+                          <p:cTn id="9" fill="hold">
+                            <p:stCondLst>
+                              <p:cond delay="0"/>
+                            </p:stCondLst>
+                            <p:childTnLst>
+                              <p:par>
+                                <p:cTn id="10" presetID="10" presetClass="entr" presetSubtype="0" fill="hold" grpId="0" nodeType="clickEffect">
+                                  <p:stCondLst>
+                                    <p:cond delay="0"/>
+                                  </p:stCondLst>
+                                  <p:childTnLst>
+                                    <p:set>
+                                      <p:cBhvr>
+                                        <p:cTn id="11" dur="1" fill="hold">
+                                          <p:stCondLst>
+                                            <p:cond delay="0"/>
+                                          </p:stCondLst>
+                                        </p:cTn>
+                                        <p:tgtEl>
+                                          <p:spTgt spid="3">
+                                            <p:txEl>
+                                              <p:pRg st="1" end="1"/>
+                                            </p:txEl>
+                                          </p:spTgt>
+                                        </p:tgtEl>
+                                        <p:attrNameLst>
+                                          <p:attrName>style.visibility</p:attrName>
+                                        </p:attrNameLst>
+                                      </p:cBhvr>
+                                      <p:to>
+                                        <p:strVal val="visible"/>
+                                      </p:to>
+                                    </p:set>
+                                    <p:animEffect transition="in" filter="fade">
+                                      <p:cBhvr>
+                                        <p:cTn id="12" dur="500"/>
+                                        <p:tgtEl>
+                                          <p:spTgt spid="3">
+                                            <p:txEl>
+                                              <p:pRg st="1" end="1"/>
+                                            </p:txEl>
+                                          </p:spTgt>
+                                        </p:tgtEl>
+                                      </p:cBhvr>
+                                    </p:animEffect>
+                                  </p:childTnLst>
+                                </p:cTn>
+                              </p:par>
+                              <p:par>
+                                <p:cTn id="13" presetID="10" presetClass="entr" presetSubtype="0" fill="hold" grpId="0" nodeType="withEffect">
+                                  <p:stCondLst>
+                                    <p:cond delay="0"/>
+                                  </p:stCondLst>
+                                  <p:childTnLst>
+                                    <p:set>
+                                      <p:cBhvr>
+                                        <p:cTn id="14" dur="1" fill="hold">
+                                          <p:stCondLst>
+                                            <p:cond delay="0"/>
+                                          </p:stCondLst>
+                                        </p:cTn>
+                                        <p:tgtEl>
+                                          <p:spTgt spid="3">
+                                            <p:txEl>
+                                              <p:pRg st="2" end="2"/>
+                                            </p:txEl>
+                                          </p:spTgt>
+                                        </p:tgtEl>
+                                        <p:attrNameLst>
+                                          <p:attrName>style.visibility</p:attrName>
+                                        </p:attrNameLst>
+                                      </p:cBhvr>
+                                      <p:to>
+                                        <p:strVal val="visible"/>
+                                      </p:to>
+                                    </p:set>
+                                    <p:animEffect transition="in" filter="fade">
+                                      <p:cBhvr>
+                                        <p:cTn id="15" dur="500"/>
+                                        <p:tgtEl>
+                                          <p:spTgt spid="3">
+                                            <p:txEl>
+                                              <p:pRg st="2" end="2"/>
+                                            </p:txEl>
+                                          </p:spTgt>
+                                        </p:tgtEl>
+                                      </p:cBhvr>
+                                    </p:animEffect>
+                                  </p:childTnLst>
+                                </p:cTn>
+                              </p:par>
+                              <p:par>
+                                <p:cTn id="16" presetID="10" presetClass="entr" presetSubtype="0" fill="hold" grpId="0" nodeType="withEffect">
+                                  <p:stCondLst>
+                                    <p:cond delay="0"/>
+                                  </p:stCondLst>
+                                  <p:childTnLst>
+                                    <p:set>
+                                      <p:cBhvr>
+                                        <p:cTn id="17" dur="1" fill="hold">
+                                          <p:stCondLst>
+                                            <p:cond delay="0"/>
+                                          </p:stCondLst>
+                                        </p:cTn>
+                                        <p:tgtEl>
+                                          <p:spTgt spid="3">
+                                            <p:txEl>
+                                              <p:pRg st="3" end="3"/>
+                                            </p:txEl>
+                                          </p:spTgt>
+                                        </p:tgtEl>
+                                        <p:attrNameLst>
+                                          <p:attrName>style.visibility</p:attrName>
+                                        </p:attrNameLst>
+                                      </p:cBhvr>
+                                      <p:to>
+                                        <p:strVal val="visible"/>
+                                      </p:to>
+                                    </p:set>
+                                    <p:animEffect transition="in" filter="fade">
+                                      <p:cBhvr>
+                                        <p:cTn id="18" dur="500"/>
+                                        <p:tgtEl>
+                                          <p:spTgt spid="3">
+                                            <p:txEl>
+                                              <p:pRg st="3" end="3"/>
+                                            </p:txEl>
+                                          </p:spTgt>
+                                        </p:tgtEl>
+                                      </p:cBhvr>
+                                    </p:animEffect>
+                                  </p:childTnLst>
+                                </p:cTn>
+                              </p:par>
+                              <p:par>
+                                <p:cTn id="19" presetID="10" presetClass="entr" presetSubtype="0" fill="hold" grpId="0" nodeType="withEffect">
+                                  <p:stCondLst>
+                                    <p:cond delay="0"/>
+                                  </p:stCondLst>
+                                  <p:childTnLst>
+                                    <p:set>
+                                      <p:cBhvr>
+                                        <p:cTn id="20" dur="1" fill="hold">
+                                          <p:stCondLst>
+                                            <p:cond delay="0"/>
+                                          </p:stCondLst>
+                                        </p:cTn>
+                                        <p:tgtEl>
+                                          <p:spTgt spid="3">
+                                            <p:txEl>
+                                              <p:pRg st="4" end="4"/>
+                                            </p:txEl>
+                                          </p:spTgt>
+                                        </p:tgtEl>
+                                        <p:attrNameLst>
+                                          <p:attrName>style.visibility</p:attrName>
+                                        </p:attrNameLst>
+                                      </p:cBhvr>
+                                      <p:to>
+                                        <p:strVal val="visible"/>
+                                      </p:to>
+                                    </p:set>
+                                    <p:animEffect transition="in" filter="fade">
+                                      <p:cBhvr>
+                                        <p:cTn id="21" dur="500"/>
+                                        <p:tgtEl>
+                                          <p:spTgt spid="3">
+                                            <p:txEl>
+                                              <p:pRg st="4" end="4"/>
+                                            </p:txEl>
+                                          </p:spTgt>
+                                        </p:tgtEl>
+                                      </p:cBhvr>
+                                    </p:animEffect>
+                                  </p:childTnLst>
+                                </p:cTn>
+                              </p:par>
+                            </p:childTnLst>
+                          </p:cTn>
+                        </p:par>
+                      </p:childTnLst>
+                    </p:cTn>
+                  </p:par>
+                </p:childTnLst>
+              </p:cTn>
+              <p:prevCondLst>
+                <p:cond evt="onPrev" delay="0">
+                  <p:tgtEl>
+                    <p:sldTgt/>
+                  </p:tgtEl>
+                </p:cond>
+              </p:prevCondLst>
+              <p:nextCondLst>
+                <p:cond evt="onNext" delay="0">
+                  <p:tgtEl>
+                    <p:sldTgt/>
+                  </p:tgtEl>
+                </p:cond>
+              </p:nextCondLst>
+            </p:seq>
+          </p:childTnLst>
+        </p:cTn>
+      </p:par>
+    </p:tnLst>
+    <p:bldLst>
+      <p:bldP spid="3" grpId="0" build="p"/>
+    </p:bldLst>
+  </p:timing>
+</p:sld>
+</file>
+
+<file path=ppt/slides/slide30.xml><?xml version="1.0" encoding="utf-8"?>
 <p:sld xmlns:a="http://schemas.openxmlformats.org/drawingml/2006/main" xmlns:r="http://schemas.openxmlformats.org/officeDocument/2006/relationships" xmlns:p="http://schemas.openxmlformats.org/presentationml/2006/main" show="0">
   <p:cSld>
     <p:spTree>
@@ -15275,7 +16969,7 @@
 </p:sld>
 </file>
 
-<file path=ppt/slides/slide22.xml><?xml version="1.0" encoding="utf-8"?>
+<file path=ppt/slides/slide31.xml><?xml version="1.0" encoding="utf-8"?>
 <p:sld xmlns:a="http://schemas.openxmlformats.org/drawingml/2006/main" xmlns:r="http://schemas.openxmlformats.org/officeDocument/2006/relationships" xmlns:p="http://schemas.openxmlformats.org/presentationml/2006/main" show="0">
   <p:cSld>
     <p:spTree>
@@ -15441,7 +17135,7 @@
 </p:sld>
 </file>
 
-<file path=ppt/slides/slide23.xml><?xml version="1.0" encoding="utf-8"?>
+<file path=ppt/slides/slide32.xml><?xml version="1.0" encoding="utf-8"?>
 <p:sld xmlns:a="http://schemas.openxmlformats.org/drawingml/2006/main" xmlns:r="http://schemas.openxmlformats.org/officeDocument/2006/relationships" xmlns:p="http://schemas.openxmlformats.org/presentationml/2006/main" show="0">
   <p:cSld>
     <p:spTree>
@@ -15607,7 +17301,7 @@
 </p:sld>
 </file>
 
-<file path=ppt/slides/slide24.xml><?xml version="1.0" encoding="utf-8"?>
+<file path=ppt/slides/slide33.xml><?xml version="1.0" encoding="utf-8"?>
 <p:sld xmlns:a="http://schemas.openxmlformats.org/drawingml/2006/main" xmlns:r="http://schemas.openxmlformats.org/officeDocument/2006/relationships" xmlns:p="http://schemas.openxmlformats.org/presentationml/2006/main" show="0">
   <p:cSld>
     <p:spTree>
@@ -15773,7 +17467,7 @@
 </p:sld>
 </file>
 
-<file path=ppt/slides/slide25.xml><?xml version="1.0" encoding="utf-8"?>
+<file path=ppt/slides/slide34.xml><?xml version="1.0" encoding="utf-8"?>
 <p:sld xmlns:a="http://schemas.openxmlformats.org/drawingml/2006/main" xmlns:r="http://schemas.openxmlformats.org/officeDocument/2006/relationships" xmlns:p="http://schemas.openxmlformats.org/presentationml/2006/main" show="0">
   <p:cSld>
     <p:spTree>
@@ -16467,7 +18161,7 @@
 </p:sld>
 </file>
 
-<file path=ppt/slides/slide26.xml><?xml version="1.0" encoding="utf-8"?>
+<file path=ppt/slides/slide35.xml><?xml version="1.0" encoding="utf-8"?>
 <p:sld xmlns:a="http://schemas.openxmlformats.org/drawingml/2006/main" xmlns:r="http://schemas.openxmlformats.org/officeDocument/2006/relationships" xmlns:p="http://schemas.openxmlformats.org/presentationml/2006/main" show="0">
   <p:cSld>
     <p:spTree>
@@ -16535,7 +18229,7 @@
 </p:sld>
 </file>
 
-<file path=ppt/slides/slide27.xml><?xml version="1.0" encoding="utf-8"?>
+<file path=ppt/slides/slide36.xml><?xml version="1.0" encoding="utf-8"?>
 <p:sld xmlns:a="http://schemas.openxmlformats.org/drawingml/2006/main" xmlns:r="http://schemas.openxmlformats.org/officeDocument/2006/relationships" xmlns:p="http://schemas.openxmlformats.org/presentationml/2006/main" show="0">
   <p:cSld>
     <p:spTree>
@@ -16580,428 +18274,6 @@
 </p:sld>
 </file>
 
-<file path=ppt/slides/slide3.xml><?xml version="1.0" encoding="utf-8"?>
-<p:sld xmlns:a="http://schemas.openxmlformats.org/drawingml/2006/main" xmlns:r="http://schemas.openxmlformats.org/officeDocument/2006/relationships" xmlns:p="http://schemas.openxmlformats.org/presentationml/2006/main">
-  <p:cSld>
-    <p:spTree>
-      <p:nvGrpSpPr>
-        <p:cNvPr id="1" name=""/>
-        <p:cNvGrpSpPr/>
-        <p:nvPr/>
-      </p:nvGrpSpPr>
-      <p:grpSpPr>
-        <a:xfrm>
-          <a:off x="0" y="0"/>
-          <a:ext cx="0" cy="0"/>
-          <a:chOff x="0" y="0"/>
-          <a:chExt cx="0" cy="0"/>
-        </a:xfrm>
-      </p:grpSpPr>
-      <p:sp>
-        <p:nvSpPr>
-          <p:cNvPr id="2" name="Title 1"/>
-          <p:cNvSpPr>
-            <a:spLocks noGrp="1"/>
-          </p:cNvSpPr>
-          <p:nvPr>
-            <p:ph type="title"/>
-          </p:nvPr>
-        </p:nvSpPr>
-        <p:spPr/>
-        <p:txBody>
-          <a:bodyPr/>
-          <a:lstStyle/>
-          <a:p>
-            <a:r>
-              <a:rPr lang="en-US" dirty="0" smtClean="0"/>
-              <a:t>Indexes</a:t>
-            </a:r>
-            <a:endParaRPr lang="en-US" dirty="0"/>
-          </a:p>
-        </p:txBody>
-      </p:sp>
-      <p:sp>
-        <p:nvSpPr>
-          <p:cNvPr id="3" name="Content Placeholder 2"/>
-          <p:cNvSpPr>
-            <a:spLocks noGrp="1"/>
-          </p:cNvSpPr>
-          <p:nvPr>
-            <p:ph idx="1"/>
-          </p:nvPr>
-        </p:nvSpPr>
-        <p:spPr>
-          <a:xfrm>
-            <a:off x="457200" y="955193"/>
-            <a:ext cx="8007739" cy="3493655"/>
-          </a:xfrm>
-        </p:spPr>
-        <p:txBody>
-          <a:bodyPr/>
-          <a:lstStyle/>
-          <a:p>
-            <a:pPr>
-              <a:lnSpc>
-                <a:spcPct val="140000"/>
-              </a:lnSpc>
-            </a:pPr>
-            <a:r>
-              <a:rPr lang="en-US" dirty="0" smtClean="0"/>
-              <a:t>Provides the foundation for N1QL Queries</a:t>
-            </a:r>
-          </a:p>
-          <a:p>
-            <a:pPr>
-              <a:lnSpc>
-                <a:spcPct val="140000"/>
-              </a:lnSpc>
-            </a:pPr>
-            <a:r>
-              <a:rPr lang="en-US" dirty="0" smtClean="0"/>
-              <a:t>Optimize the data lookup path for the query engine</a:t>
-            </a:r>
-            <a:endParaRPr lang="en-US" dirty="0" smtClean="0"/>
-          </a:p>
-          <a:p>
-            <a:pPr>
-              <a:lnSpc>
-                <a:spcPct val="140000"/>
-              </a:lnSpc>
-            </a:pPr>
-            <a:r>
-              <a:rPr lang="en-US" dirty="0" smtClean="0"/>
-              <a:t>Two types of indexes</a:t>
-            </a:r>
-          </a:p>
-          <a:p>
-            <a:pPr lvl="1">
-              <a:lnSpc>
-                <a:spcPct val="140000"/>
-              </a:lnSpc>
-            </a:pPr>
-            <a:r>
-              <a:rPr lang="en-US" dirty="0" smtClean="0"/>
-              <a:t>View indexes</a:t>
-            </a:r>
-          </a:p>
-          <a:p>
-            <a:pPr lvl="1">
-              <a:lnSpc>
-                <a:spcPct val="140000"/>
-              </a:lnSpc>
-            </a:pPr>
-            <a:r>
-              <a:rPr lang="en-US" dirty="0" smtClean="0"/>
-              <a:t>GSI indexes (new </a:t>
-            </a:r>
-            <a:r>
-              <a:rPr lang="en-US" dirty="0" smtClean="0"/>
-              <a:t>global secondary </a:t>
-            </a:r>
-            <a:r>
-              <a:rPr lang="en-US" dirty="0" smtClean="0"/>
-              <a:t>indexes)</a:t>
-            </a:r>
-          </a:p>
-        </p:txBody>
-      </p:sp>
-    </p:spTree>
-    <p:extLst>
-      <p:ext uri="{BB962C8B-B14F-4D97-AF65-F5344CB8AC3E}">
-        <p14:creationId xmlns:p14="http://schemas.microsoft.com/office/powerpoint/2010/main" val="230402553"/>
-      </p:ext>
-    </p:extLst>
-  </p:cSld>
-  <p:clrMapOvr>
-    <a:masterClrMapping/>
-  </p:clrMapOvr>
-  <p:timing>
-    <p:tnLst>
-      <p:par>
-        <p:cTn xmlns:p14="http://schemas.microsoft.com/office/powerpoint/2010/main" id="1" dur="indefinite" restart="never" nodeType="tmRoot">
-          <p:childTnLst>
-            <p:seq concurrent="1" nextAc="seek">
-              <p:cTn id="2" dur="indefinite" nodeType="mainSeq">
-                <p:childTnLst>
-                  <p:par>
-                    <p:cTn id="3" fill="hold">
-                      <p:stCondLst>
-                        <p:cond delay="indefinite"/>
-                      </p:stCondLst>
-                      <p:childTnLst>
-                        <p:par>
-                          <p:cTn id="4" fill="hold">
-                            <p:stCondLst>
-                              <p:cond delay="0"/>
-                            </p:stCondLst>
-                            <p:childTnLst>
-                              <p:par>
-                                <p:cTn id="5" presetID="10" presetClass="entr" presetSubtype="0" fill="hold" grpId="0" nodeType="clickEffect">
-                                  <p:stCondLst>
-                                    <p:cond delay="0"/>
-                                  </p:stCondLst>
-                                  <p:childTnLst>
-                                    <p:set>
-                                      <p:cBhvr>
-                                        <p:cTn id="6" dur="1" fill="hold">
-                                          <p:stCondLst>
-                                            <p:cond delay="0"/>
-                                          </p:stCondLst>
-                                        </p:cTn>
-                                        <p:tgtEl>
-                                          <p:spTgt spid="3">
-                                            <p:txEl>
-                                              <p:pRg st="0" end="0"/>
-                                            </p:txEl>
-                                          </p:spTgt>
-                                        </p:tgtEl>
-                                        <p:attrNameLst>
-                                          <p:attrName>style.visibility</p:attrName>
-                                        </p:attrNameLst>
-                                      </p:cBhvr>
-                                      <p:to>
-                                        <p:strVal val="visible"/>
-                                      </p:to>
-                                    </p:set>
-                                    <p:animEffect transition="in" filter="fade">
-                                      <p:cBhvr>
-                                        <p:cTn id="7" dur="500"/>
-                                        <p:tgtEl>
-                                          <p:spTgt spid="3">
-                                            <p:txEl>
-                                              <p:pRg st="0" end="0"/>
-                                            </p:txEl>
-                                          </p:spTgt>
-                                        </p:tgtEl>
-                                      </p:cBhvr>
-                                    </p:animEffect>
-                                  </p:childTnLst>
-                                </p:cTn>
-                              </p:par>
-                            </p:childTnLst>
-                          </p:cTn>
-                        </p:par>
-                      </p:childTnLst>
-                    </p:cTn>
-                  </p:par>
-                  <p:par>
-                    <p:cTn id="8" fill="hold">
-                      <p:stCondLst>
-                        <p:cond delay="indefinite"/>
-                      </p:stCondLst>
-                      <p:childTnLst>
-                        <p:par>
-                          <p:cTn id="9" fill="hold">
-                            <p:stCondLst>
-                              <p:cond delay="0"/>
-                            </p:stCondLst>
-                            <p:childTnLst>
-                              <p:par>
-                                <p:cTn id="10" presetID="10" presetClass="entr" presetSubtype="0" fill="hold" grpId="0" nodeType="clickEffect">
-                                  <p:stCondLst>
-                                    <p:cond delay="0"/>
-                                  </p:stCondLst>
-                                  <p:childTnLst>
-                                    <p:set>
-                                      <p:cBhvr>
-                                        <p:cTn id="11" dur="1" fill="hold">
-                                          <p:stCondLst>
-                                            <p:cond delay="0"/>
-                                          </p:stCondLst>
-                                        </p:cTn>
-                                        <p:tgtEl>
-                                          <p:spTgt spid="3">
-                                            <p:txEl>
-                                              <p:pRg st="1" end="1"/>
-                                            </p:txEl>
-                                          </p:spTgt>
-                                        </p:tgtEl>
-                                        <p:attrNameLst>
-                                          <p:attrName>style.visibility</p:attrName>
-                                        </p:attrNameLst>
-                                      </p:cBhvr>
-                                      <p:to>
-                                        <p:strVal val="visible"/>
-                                      </p:to>
-                                    </p:set>
-                                    <p:animEffect transition="in" filter="fade">
-                                      <p:cBhvr>
-                                        <p:cTn id="12" dur="500"/>
-                                        <p:tgtEl>
-                                          <p:spTgt spid="3">
-                                            <p:txEl>
-                                              <p:pRg st="1" end="1"/>
-                                            </p:txEl>
-                                          </p:spTgt>
-                                        </p:tgtEl>
-                                      </p:cBhvr>
-                                    </p:animEffect>
-                                  </p:childTnLst>
-                                </p:cTn>
-                              </p:par>
-                              <p:par>
-                                <p:cTn id="13" presetID="10" presetClass="entr" presetSubtype="0" fill="hold" grpId="0" nodeType="withEffect">
-                                  <p:stCondLst>
-                                    <p:cond delay="0"/>
-                                  </p:stCondLst>
-                                  <p:childTnLst>
-                                    <p:set>
-                                      <p:cBhvr>
-                                        <p:cTn id="14" dur="1" fill="hold">
-                                          <p:stCondLst>
-                                            <p:cond delay="0"/>
-                                          </p:stCondLst>
-                                        </p:cTn>
-                                        <p:tgtEl>
-                                          <p:spTgt spid="3">
-                                            <p:txEl>
-                                              <p:pRg st="2" end="2"/>
-                                            </p:txEl>
-                                          </p:spTgt>
-                                        </p:tgtEl>
-                                        <p:attrNameLst>
-                                          <p:attrName>style.visibility</p:attrName>
-                                        </p:attrNameLst>
-                                      </p:cBhvr>
-                                      <p:to>
-                                        <p:strVal val="visible"/>
-                                      </p:to>
-                                    </p:set>
-                                    <p:animEffect transition="in" filter="fade">
-                                      <p:cBhvr>
-                                        <p:cTn id="15" dur="500"/>
-                                        <p:tgtEl>
-                                          <p:spTgt spid="3">
-                                            <p:txEl>
-                                              <p:pRg st="2" end="2"/>
-                                            </p:txEl>
-                                          </p:spTgt>
-                                        </p:tgtEl>
-                                      </p:cBhvr>
-                                    </p:animEffect>
-                                  </p:childTnLst>
-                                </p:cTn>
-                              </p:par>
-                              <p:par>
-                                <p:cTn id="16" presetID="10" presetClass="entr" presetSubtype="0" fill="hold" grpId="0" nodeType="withEffect">
-                                  <p:stCondLst>
-                                    <p:cond delay="0"/>
-                                  </p:stCondLst>
-                                  <p:childTnLst>
-                                    <p:set>
-                                      <p:cBhvr>
-                                        <p:cTn id="17" dur="1" fill="hold">
-                                          <p:stCondLst>
-                                            <p:cond delay="0"/>
-                                          </p:stCondLst>
-                                        </p:cTn>
-                                        <p:tgtEl>
-                                          <p:spTgt spid="3">
-                                            <p:txEl>
-                                              <p:pRg st="3" end="3"/>
-                                            </p:txEl>
-                                          </p:spTgt>
-                                        </p:tgtEl>
-                                        <p:attrNameLst>
-                                          <p:attrName>style.visibility</p:attrName>
-                                        </p:attrNameLst>
-                                      </p:cBhvr>
-                                      <p:to>
-                                        <p:strVal val="visible"/>
-                                      </p:to>
-                                    </p:set>
-                                    <p:animEffect transition="in" filter="fade">
-                                      <p:cBhvr>
-                                        <p:cTn id="18" dur="500"/>
-                                        <p:tgtEl>
-                                          <p:spTgt spid="3">
-                                            <p:txEl>
-                                              <p:pRg st="3" end="3"/>
-                                            </p:txEl>
-                                          </p:spTgt>
-                                        </p:tgtEl>
-                                      </p:cBhvr>
-                                    </p:animEffect>
-                                  </p:childTnLst>
-                                </p:cTn>
-                              </p:par>
-                              <p:par>
-                                <p:cTn id="19" presetID="10" presetClass="entr" presetSubtype="0" fill="hold" grpId="0" nodeType="withEffect">
-                                  <p:stCondLst>
-                                    <p:cond delay="0"/>
-                                  </p:stCondLst>
-                                  <p:childTnLst>
-                                    <p:set>
-                                      <p:cBhvr>
-                                        <p:cTn id="20" dur="1" fill="hold">
-                                          <p:stCondLst>
-                                            <p:cond delay="0"/>
-                                          </p:stCondLst>
-                                        </p:cTn>
-                                        <p:tgtEl>
-                                          <p:spTgt spid="3">
-                                            <p:txEl>
-                                              <p:pRg st="4" end="4"/>
-                                            </p:txEl>
-                                          </p:spTgt>
-                                        </p:tgtEl>
-                                        <p:attrNameLst>
-                                          <p:attrName>style.visibility</p:attrName>
-                                        </p:attrNameLst>
-                                      </p:cBhvr>
-                                      <p:to>
-                                        <p:strVal val="visible"/>
-                                      </p:to>
-                                    </p:set>
-                                    <p:animEffect transition="in" filter="fade">
-                                      <p:cBhvr>
-                                        <p:cTn id="21" dur="500"/>
-                                        <p:tgtEl>
-                                          <p:spTgt spid="3">
-                                            <p:txEl>
-                                              <p:pRg st="4" end="4"/>
-                                            </p:txEl>
-                                          </p:spTgt>
-                                        </p:tgtEl>
-                                      </p:cBhvr>
-                                    </p:animEffect>
-                                  </p:childTnLst>
-                                </p:cTn>
-                              </p:par>
-                            </p:childTnLst>
-                          </p:cTn>
-                        </p:par>
-                      </p:childTnLst>
-                    </p:cTn>
-                  </p:par>
-                </p:childTnLst>
-              </p:cTn>
-              <p:prevCondLst>
-                <p:cond evt="onPrev" delay="0">
-                  <p:tgtEl>
-                    <p:sldTgt/>
-                  </p:tgtEl>
-                </p:cond>
-              </p:prevCondLst>
-              <p:nextCondLst>
-                <p:cond evt="onNext" delay="0">
-                  <p:tgtEl>
-                    <p:sldTgt/>
-                  </p:tgtEl>
-                </p:cond>
-              </p:nextCondLst>
-            </p:seq>
-          </p:childTnLst>
-        </p:cTn>
-      </p:par>
-    </p:tnLst>
-    <p:bldLst>
-      <p:bldP spid="3" grpId="0" build="p"/>
-    </p:bldLst>
-  </p:timing>
-</p:sld>
-</file>
-
 <file path=ppt/slides/slide4.xml><?xml version="1.0" encoding="utf-8"?>
 <p:sld xmlns:a="http://schemas.openxmlformats.org/drawingml/2006/main" xmlns:r="http://schemas.openxmlformats.org/officeDocument/2006/relationships" xmlns:p="http://schemas.openxmlformats.org/presentationml/2006/main">
   <p:cSld>
@@ -17036,7 +18308,7 @@
           <a:p>
             <a:r>
               <a:rPr lang="en-US" dirty="0" smtClean="0"/>
-              <a:t>Indexes</a:t>
+              <a:t>Index Management</a:t>
             </a:r>
             <a:endParaRPr lang="en-US" dirty="0"/>
           </a:p>
@@ -17068,9 +18340,14 @@
               </a:lnSpc>
             </a:pPr>
             <a:r>
+              <a:rPr lang="en-US" dirty="0"/>
+              <a:t>Names are unique on a per-bucket </a:t>
+            </a:r>
+            <a:r>
               <a:rPr lang="en-US" dirty="0" smtClean="0"/>
-              <a:t>Can be created and dropped</a:t>
+              <a:t>basis</a:t>
             </a:r>
+            <a:endParaRPr lang="en-US" dirty="0" smtClean="0"/>
           </a:p>
           <a:p>
             <a:pPr>
@@ -17080,7 +18357,11 @@
             </a:pPr>
             <a:r>
               <a:rPr lang="en-US" dirty="0" smtClean="0"/>
-              <a:t>Names are unique on a per-bucket basis</a:t>
+              <a:t>Indexes can </a:t>
+            </a:r>
+            <a:r>
+              <a:rPr lang="en-US" dirty="0" smtClean="0"/>
+              <a:t>be created and dropped</a:t>
             </a:r>
           </a:p>
           <a:p>
@@ -17091,101 +18372,28 @@
             </a:pPr>
             <a:r>
               <a:rPr lang="en-US" dirty="0" smtClean="0"/>
-              <a:t>Special case: primary index</a:t>
-            </a:r>
-            <a:endParaRPr lang="en-US" dirty="0" smtClean="0"/>
-          </a:p>
-        </p:txBody>
-      </p:sp>
-      <p:sp>
-        <p:nvSpPr>
-          <p:cNvPr id="4" name="Textfeld 3"/>
-          <p:cNvSpPr txBox="1"/>
-          <p:nvPr/>
-        </p:nvSpPr>
-        <p:spPr>
-          <a:xfrm>
-            <a:off x="466344" y="3186288"/>
-            <a:ext cx="7755319" cy="1477328"/>
-          </a:xfrm>
-          <a:prstGeom prst="rect">
-            <a:avLst/>
-          </a:prstGeom>
-          <a:noFill/>
-        </p:spPr>
-        <p:txBody>
-          <a:bodyPr wrap="square" rtlCol="0">
-            <a:spAutoFit/>
-          </a:bodyPr>
-          <a:lstStyle/>
-          <a:p>
-            <a:r>
-              <a:rPr lang="de-DE" dirty="0" smtClean="0"/>
-              <a:t>CREATE PRIMARY INDEX ON &lt;</a:t>
+              <a:t>Special </a:t>
             </a:r>
             <a:r>
-              <a:rPr lang="de-DE" dirty="0" err="1" smtClean="0"/>
-              <a:t>bucket</a:t>
+              <a:rPr lang="en-US" dirty="0" smtClean="0"/>
+              <a:t>case: primary </a:t>
             </a:r>
             <a:r>
-              <a:rPr lang="de-DE" dirty="0" smtClean="0"/>
-              <a:t>&gt;</a:t>
+              <a:rPr lang="en-US" dirty="0" smtClean="0"/>
+              <a:t>index</a:t>
             </a:r>
-          </a:p>
-          <a:p>
-            <a:endParaRPr lang="de-DE" dirty="0"/>
-          </a:p>
-          <a:p>
+            <a:endParaRPr lang="en-US" dirty="0"/>
+          </a:p>
+          <a:p>
+            <a:pPr>
+              <a:lnSpc>
+                <a:spcPct val="140000"/>
+              </a:lnSpc>
+            </a:pPr>
             <a:r>
-              <a:rPr lang="de-DE" dirty="0" smtClean="0"/>
-              <a:t>CREATE INDEX &lt;index-name&gt; ON &lt;</a:t>
+              <a:rPr lang="en-US" dirty="0" smtClean="0"/>
+              <a:t>Management done through N1QL DDL Statements</a:t>
             </a:r>
-            <a:r>
-              <a:rPr lang="de-DE" dirty="0" err="1" smtClean="0"/>
-              <a:t>bucket</a:t>
-            </a:r>
-            <a:r>
-              <a:rPr lang="de-DE" dirty="0" smtClean="0"/>
-              <a:t>&gt; (</a:t>
-            </a:r>
-            <a:r>
-              <a:rPr lang="de-DE" dirty="0" err="1" smtClean="0"/>
-              <a:t>expressions</a:t>
-            </a:r>
-            <a:r>
-              <a:rPr lang="de-DE" dirty="0" smtClean="0"/>
-              <a:t>) [</a:t>
-            </a:r>
-            <a:r>
-              <a:rPr lang="de-DE" dirty="0" err="1" smtClean="0"/>
-              <a:t>where</a:t>
-            </a:r>
-            <a:r>
-              <a:rPr lang="de-DE" dirty="0" smtClean="0"/>
-              <a:t>] [</a:t>
-            </a:r>
-            <a:r>
-              <a:rPr lang="de-DE" dirty="0" err="1" smtClean="0"/>
-              <a:t>using</a:t>
-            </a:r>
-            <a:r>
-              <a:rPr lang="de-DE" dirty="0" smtClean="0"/>
-              <a:t>]</a:t>
-            </a:r>
-          </a:p>
-          <a:p>
-            <a:endParaRPr lang="de-DE" dirty="0"/>
-          </a:p>
-          <a:p>
-            <a:r>
-              <a:rPr lang="de-DE" dirty="0" smtClean="0"/>
-              <a:t>SELECT * FROM </a:t>
-            </a:r>
-            <a:r>
-              <a:rPr lang="de-DE" dirty="0" err="1" smtClean="0"/>
-              <a:t>system:indexes</a:t>
-            </a:r>
-            <a:endParaRPr lang="de-DE" dirty="0"/>
           </a:p>
         </p:txBody>
       </p:sp>
@@ -17390,6 +18598,67 @@
                       </p:childTnLst>
                     </p:cTn>
                   </p:par>
+                  <p:par>
+                    <p:cTn id="18" fill="hold">
+                      <p:stCondLst>
+                        <p:cond delay="indefinite"/>
+                      </p:stCondLst>
+                      <p:childTnLst>
+                        <p:par>
+                          <p:cTn id="19" fill="hold">
+                            <p:stCondLst>
+                              <p:cond delay="0"/>
+                            </p:stCondLst>
+                            <p:childTnLst>
+                              <p:par>
+                                <p:cTn id="20" presetID="10" presetClass="entr" presetSubtype="0" fill="hold" grpId="0" nodeType="clickEffect">
+                                  <p:stCondLst>
+                                    <p:cond delay="0"/>
+                                  </p:stCondLst>
+                                  <p:childTnLst>
+                                    <p:set>
+                                      <p:cBhvr>
+                                        <p:cTn id="21" dur="1" fill="hold">
+                                          <p:stCondLst>
+                                            <p:cond delay="0"/>
+                                          </p:stCondLst>
+                                        </p:cTn>
+                                        <p:tgtEl>
+                                          <p:spTgt spid="3">
+                                            <p:txEl>
+                                              <p:pRg st="3" end="3"/>
+                                            </p:txEl>
+                                          </p:spTgt>
+                                        </p:tgtEl>
+                                        <p:attrNameLst>
+                                          <p:attrName>style.visibility</p:attrName>
+                                        </p:attrNameLst>
+                                      </p:cBhvr>
+                                      <p:to>
+                                        <p:strVal val="visible"/>
+                                      </p:to>
+                                    </p:set>
+                                    <p:animEffect transition="in" filter="fade">
+                                      <p:cBhvr>
+                                        <p:cTn id="22" dur="500"/>
+                                        <p:tgtEl>
+                                          <p:spTgt spid="3">
+                                            <p:txEl>
+                                              <p:pRg st="3" end="3"/>
+                                            </p:txEl>
+                                          </p:spTgt>
+                                        </p:tgtEl>
+                                      </p:cBhvr>
+                                    </p:animEffect>
+                                  </p:childTnLst>
+                                </p:cTn>
+                              </p:par>
+                            </p:childTnLst>
+                          </p:cTn>
+                        </p:par>
+                      </p:childTnLst>
+                    </p:cTn>
+                  </p:par>
                 </p:childTnLst>
               </p:cTn>
               <p:prevCondLst>
@@ -17442,7 +18711,7 @@
             <a:spLocks noGrp="1"/>
           </p:cNvSpPr>
           <p:nvPr>
-            <p:ph type="ctrTitle"/>
+            <p:ph type="title"/>
           </p:nvPr>
         </p:nvSpPr>
         <p:spPr/>
@@ -17452,16 +18721,45 @@
           <a:p>
             <a:r>
               <a:rPr lang="en-US" dirty="0" smtClean="0"/>
-              <a:t>SDK Interaction - Java</a:t>
+              <a:t>Index Information</a:t>
             </a:r>
             <a:endParaRPr lang="en-US" dirty="0"/>
+          </a:p>
+        </p:txBody>
+      </p:sp>
+      <p:sp>
+        <p:nvSpPr>
+          <p:cNvPr id="3" name="Content Placeholder 2"/>
+          <p:cNvSpPr>
+            <a:spLocks noGrp="1"/>
+          </p:cNvSpPr>
+          <p:nvPr>
+            <p:ph idx="1"/>
+          </p:nvPr>
+        </p:nvSpPr>
+        <p:spPr>
+          <a:xfrm>
+            <a:off x="457200" y="955193"/>
+            <a:ext cx="8007739" cy="3493655"/>
+          </a:xfrm>
+        </p:spPr>
+        <p:txBody>
+          <a:bodyPr/>
+          <a:lstStyle/>
+          <a:p>
+            <a:pPr>
+              <a:lnSpc>
+                <a:spcPct val="140000"/>
+              </a:lnSpc>
+            </a:pPr>
+            <a:endParaRPr lang="en-US" dirty="0" smtClean="0"/>
           </a:p>
         </p:txBody>
       </p:sp>
     </p:spTree>
     <p:extLst>
       <p:ext uri="{BB962C8B-B14F-4D97-AF65-F5344CB8AC3E}">
-        <p14:creationId xmlns:p14="http://schemas.microsoft.com/office/powerpoint/2010/main" val="3683186877"/>
+        <p14:creationId xmlns:p14="http://schemas.microsoft.com/office/powerpoint/2010/main" val="1759778519"/>
       </p:ext>
     </p:extLst>
   </p:cSld>
@@ -17471,9 +18769,101 @@
   <p:timing>
     <p:tnLst>
       <p:par>
-        <p:cTn xmlns:p14="http://schemas.microsoft.com/office/powerpoint/2010/main" id="1" dur="indefinite" restart="never" nodeType="tmRoot"/>
+        <p:cTn xmlns:p14="http://schemas.microsoft.com/office/powerpoint/2010/main" id="1" dur="indefinite" restart="never" nodeType="tmRoot">
+          <p:childTnLst>
+            <p:seq concurrent="1" nextAc="seek">
+              <p:cTn id="2" dur="indefinite" nodeType="mainSeq">
+                <p:childTnLst>
+                  <p:par>
+                    <p:cTn id="3" fill="hold">
+                      <p:stCondLst>
+                        <p:cond delay="indefinite"/>
+                      </p:stCondLst>
+                      <p:childTnLst>
+                        <p:par>
+                          <p:cTn id="4" fill="hold">
+                            <p:stCondLst>
+                              <p:cond delay="0"/>
+                            </p:stCondLst>
+                            <p:childTnLst>
+                              <p:par>
+                                <p:cTn id="5" presetID="10" presetClass="entr" presetSubtype="0" fill="hold" grpId="0" nodeType="clickEffect" nodePh="1">
+                                  <p:stCondLst>
+                                    <p:cond delay="0"/>
+                                  </p:stCondLst>
+                                  <p:endCondLst>
+                                    <p:cond evt="begin" delay="0">
+                                      <p:tn val="5"/>
+                                    </p:cond>
+                                  </p:endCondLst>
+                                  <p:childTnLst>
+                                    <p:set>
+                                      <p:cBhvr>
+                                        <p:cTn id="6" dur="1" fill="hold">
+                                          <p:stCondLst>
+                                            <p:cond delay="0"/>
+                                          </p:stCondLst>
+                                        </p:cTn>
+                                        <p:tgtEl>
+                                          <p:spTgt spid="3">
+                                            <p:txEl>
+                                              <p:pRg st="0" end="0"/>
+                                            </p:txEl>
+                                          </p:spTgt>
+                                        </p:tgtEl>
+                                        <p:attrNameLst>
+                                          <p:attrName>style.visibility</p:attrName>
+                                        </p:attrNameLst>
+                                      </p:cBhvr>
+                                      <p:to>
+                                        <p:strVal val="visible"/>
+                                      </p:to>
+                                    </p:set>
+                                    <p:animEffect transition="in" filter="fade">
+                                      <p:cBhvr>
+                                        <p:cTn id="7" dur="500"/>
+                                        <p:tgtEl>
+                                          <p:spTgt spid="3">
+                                            <p:txEl>
+                                              <p:pRg st="0" end="0"/>
+                                            </p:txEl>
+                                          </p:spTgt>
+                                        </p:tgtEl>
+                                      </p:cBhvr>
+                                    </p:animEffect>
+                                  </p:childTnLst>
+                                </p:cTn>
+                              </p:par>
+                            </p:childTnLst>
+                          </p:cTn>
+                        </p:par>
+                      </p:childTnLst>
+                    </p:cTn>
+                  </p:par>
+                </p:childTnLst>
+              </p:cTn>
+              <p:prevCondLst>
+                <p:cond evt="onPrev" delay="0">
+                  <p:tgtEl>
+                    <p:sldTgt/>
+                  </p:tgtEl>
+                </p:cond>
+              </p:prevCondLst>
+              <p:nextCondLst>
+                <p:cond evt="onNext" delay="0">
+                  <p:tgtEl>
+                    <p:sldTgt/>
+                  </p:tgtEl>
+                </p:cond>
+              </p:nextCondLst>
+            </p:seq>
+          </p:childTnLst>
+        </p:cTn>
       </p:par>
     </p:tnLst>
+    <p:bldLst>
+      <p:bldP spid="3" grpId="0" build="p"/>
+    </p:bldLst>
   </p:timing>
 </p:sld>
 </file>
@@ -17502,7 +18892,7 @@
             <a:spLocks noGrp="1"/>
           </p:cNvSpPr>
           <p:nvPr>
-            <p:ph type="ctrTitle"/>
+            <p:ph type="title"/>
           </p:nvPr>
         </p:nvSpPr>
         <p:spPr/>
@@ -17512,16 +18902,45 @@
           <a:p>
             <a:r>
               <a:rPr lang="en-US" dirty="0" smtClean="0"/>
-              <a:t>SDK Interaction - .NET</a:t>
+              <a:t>Index Creation</a:t>
             </a:r>
             <a:endParaRPr lang="en-US" dirty="0"/>
+          </a:p>
+        </p:txBody>
+      </p:sp>
+      <p:sp>
+        <p:nvSpPr>
+          <p:cNvPr id="3" name="Content Placeholder 2"/>
+          <p:cNvSpPr>
+            <a:spLocks noGrp="1"/>
+          </p:cNvSpPr>
+          <p:nvPr>
+            <p:ph idx="1"/>
+          </p:nvPr>
+        </p:nvSpPr>
+        <p:spPr>
+          <a:xfrm>
+            <a:off x="457200" y="955193"/>
+            <a:ext cx="8007739" cy="3493655"/>
+          </a:xfrm>
+        </p:spPr>
+        <p:txBody>
+          <a:bodyPr/>
+          <a:lstStyle/>
+          <a:p>
+            <a:pPr>
+              <a:lnSpc>
+                <a:spcPct val="140000"/>
+              </a:lnSpc>
+            </a:pPr>
+            <a:endParaRPr lang="en-US" dirty="0" smtClean="0"/>
           </a:p>
         </p:txBody>
       </p:sp>
     </p:spTree>
     <p:extLst>
       <p:ext uri="{BB962C8B-B14F-4D97-AF65-F5344CB8AC3E}">
-        <p14:creationId xmlns:p14="http://schemas.microsoft.com/office/powerpoint/2010/main" val="882545490"/>
+        <p14:creationId xmlns:p14="http://schemas.microsoft.com/office/powerpoint/2010/main" val="632303638"/>
       </p:ext>
     </p:extLst>
   </p:cSld>
@@ -17531,9 +18950,101 @@
   <p:timing>
     <p:tnLst>
       <p:par>
-        <p:cTn xmlns:p14="http://schemas.microsoft.com/office/powerpoint/2010/main" id="1" dur="indefinite" restart="never" nodeType="tmRoot"/>
+        <p:cTn xmlns:p14="http://schemas.microsoft.com/office/powerpoint/2010/main" id="1" dur="indefinite" restart="never" nodeType="tmRoot">
+          <p:childTnLst>
+            <p:seq concurrent="1" nextAc="seek">
+              <p:cTn id="2" dur="indefinite" nodeType="mainSeq">
+                <p:childTnLst>
+                  <p:par>
+                    <p:cTn id="3" fill="hold">
+                      <p:stCondLst>
+                        <p:cond delay="indefinite"/>
+                      </p:stCondLst>
+                      <p:childTnLst>
+                        <p:par>
+                          <p:cTn id="4" fill="hold">
+                            <p:stCondLst>
+                              <p:cond delay="0"/>
+                            </p:stCondLst>
+                            <p:childTnLst>
+                              <p:par>
+                                <p:cTn id="5" presetID="10" presetClass="entr" presetSubtype="0" fill="hold" grpId="0" nodeType="clickEffect" nodePh="1">
+                                  <p:stCondLst>
+                                    <p:cond delay="0"/>
+                                  </p:stCondLst>
+                                  <p:endCondLst>
+                                    <p:cond evt="begin" delay="0">
+                                      <p:tn val="5"/>
+                                    </p:cond>
+                                  </p:endCondLst>
+                                  <p:childTnLst>
+                                    <p:set>
+                                      <p:cBhvr>
+                                        <p:cTn id="6" dur="1" fill="hold">
+                                          <p:stCondLst>
+                                            <p:cond delay="0"/>
+                                          </p:stCondLst>
+                                        </p:cTn>
+                                        <p:tgtEl>
+                                          <p:spTgt spid="3">
+                                            <p:txEl>
+                                              <p:pRg st="0" end="0"/>
+                                            </p:txEl>
+                                          </p:spTgt>
+                                        </p:tgtEl>
+                                        <p:attrNameLst>
+                                          <p:attrName>style.visibility</p:attrName>
+                                        </p:attrNameLst>
+                                      </p:cBhvr>
+                                      <p:to>
+                                        <p:strVal val="visible"/>
+                                      </p:to>
+                                    </p:set>
+                                    <p:animEffect transition="in" filter="fade">
+                                      <p:cBhvr>
+                                        <p:cTn id="7" dur="500"/>
+                                        <p:tgtEl>
+                                          <p:spTgt spid="3">
+                                            <p:txEl>
+                                              <p:pRg st="0" end="0"/>
+                                            </p:txEl>
+                                          </p:spTgt>
+                                        </p:tgtEl>
+                                      </p:cBhvr>
+                                    </p:animEffect>
+                                  </p:childTnLst>
+                                </p:cTn>
+                              </p:par>
+                            </p:childTnLst>
+                          </p:cTn>
+                        </p:par>
+                      </p:childTnLst>
+                    </p:cTn>
+                  </p:par>
+                </p:childTnLst>
+              </p:cTn>
+              <p:prevCondLst>
+                <p:cond evt="onPrev" delay="0">
+                  <p:tgtEl>
+                    <p:sldTgt/>
+                  </p:tgtEl>
+                </p:cond>
+              </p:prevCondLst>
+              <p:nextCondLst>
+                <p:cond evt="onNext" delay="0">
+                  <p:tgtEl>
+                    <p:sldTgt/>
+                  </p:tgtEl>
+                </p:cond>
+              </p:nextCondLst>
+            </p:seq>
+          </p:childTnLst>
+        </p:cTn>
       </p:par>
     </p:tnLst>
+    <p:bldLst>
+      <p:bldP spid="3" grpId="0" build="p"/>
+    </p:bldLst>
   </p:timing>
 </p:sld>
 </file>
@@ -17562,7 +19073,7 @@
             <a:spLocks noGrp="1"/>
           </p:cNvSpPr>
           <p:nvPr>
-            <p:ph type="ctrTitle"/>
+            <p:ph type="title"/>
           </p:nvPr>
         </p:nvSpPr>
         <p:spPr/>
@@ -17572,20 +19083,45 @@
           <a:p>
             <a:r>
               <a:rPr lang="en-US" dirty="0" smtClean="0"/>
-              <a:t>SDK Interaction - </a:t>
-            </a:r>
-            <a:r>
-              <a:rPr lang="en-US" dirty="0" err="1" smtClean="0"/>
-              <a:t>NodeJS</a:t>
+              <a:t>Index Removal</a:t>
             </a:r>
             <a:endParaRPr lang="en-US" dirty="0"/>
+          </a:p>
+        </p:txBody>
+      </p:sp>
+      <p:sp>
+        <p:nvSpPr>
+          <p:cNvPr id="3" name="Content Placeholder 2"/>
+          <p:cNvSpPr>
+            <a:spLocks noGrp="1"/>
+          </p:cNvSpPr>
+          <p:nvPr>
+            <p:ph idx="1"/>
+          </p:nvPr>
+        </p:nvSpPr>
+        <p:spPr>
+          <a:xfrm>
+            <a:off x="457200" y="955193"/>
+            <a:ext cx="8007739" cy="3493655"/>
+          </a:xfrm>
+        </p:spPr>
+        <p:txBody>
+          <a:bodyPr/>
+          <a:lstStyle/>
+          <a:p>
+            <a:pPr>
+              <a:lnSpc>
+                <a:spcPct val="140000"/>
+              </a:lnSpc>
+            </a:pPr>
+            <a:endParaRPr lang="en-US" dirty="0" smtClean="0"/>
           </a:p>
         </p:txBody>
       </p:sp>
     </p:spTree>
     <p:extLst>
       <p:ext uri="{BB962C8B-B14F-4D97-AF65-F5344CB8AC3E}">
-        <p14:creationId xmlns:p14="http://schemas.microsoft.com/office/powerpoint/2010/main" val="3686523847"/>
+        <p14:creationId xmlns:p14="http://schemas.microsoft.com/office/powerpoint/2010/main" val="1530284123"/>
       </p:ext>
     </p:extLst>
   </p:cSld>
@@ -17595,9 +19131,101 @@
   <p:timing>
     <p:tnLst>
       <p:par>
-        <p:cTn xmlns:p14="http://schemas.microsoft.com/office/powerpoint/2010/main" id="1" dur="indefinite" restart="never" nodeType="tmRoot"/>
+        <p:cTn xmlns:p14="http://schemas.microsoft.com/office/powerpoint/2010/main" id="1" dur="indefinite" restart="never" nodeType="tmRoot">
+          <p:childTnLst>
+            <p:seq concurrent="1" nextAc="seek">
+              <p:cTn id="2" dur="indefinite" nodeType="mainSeq">
+                <p:childTnLst>
+                  <p:par>
+                    <p:cTn id="3" fill="hold">
+                      <p:stCondLst>
+                        <p:cond delay="indefinite"/>
+                      </p:stCondLst>
+                      <p:childTnLst>
+                        <p:par>
+                          <p:cTn id="4" fill="hold">
+                            <p:stCondLst>
+                              <p:cond delay="0"/>
+                            </p:stCondLst>
+                            <p:childTnLst>
+                              <p:par>
+                                <p:cTn id="5" presetID="10" presetClass="entr" presetSubtype="0" fill="hold" grpId="0" nodeType="clickEffect" nodePh="1">
+                                  <p:stCondLst>
+                                    <p:cond delay="0"/>
+                                  </p:stCondLst>
+                                  <p:endCondLst>
+                                    <p:cond evt="begin" delay="0">
+                                      <p:tn val="5"/>
+                                    </p:cond>
+                                  </p:endCondLst>
+                                  <p:childTnLst>
+                                    <p:set>
+                                      <p:cBhvr>
+                                        <p:cTn id="6" dur="1" fill="hold">
+                                          <p:stCondLst>
+                                            <p:cond delay="0"/>
+                                          </p:stCondLst>
+                                        </p:cTn>
+                                        <p:tgtEl>
+                                          <p:spTgt spid="3">
+                                            <p:txEl>
+                                              <p:pRg st="0" end="0"/>
+                                            </p:txEl>
+                                          </p:spTgt>
+                                        </p:tgtEl>
+                                        <p:attrNameLst>
+                                          <p:attrName>style.visibility</p:attrName>
+                                        </p:attrNameLst>
+                                      </p:cBhvr>
+                                      <p:to>
+                                        <p:strVal val="visible"/>
+                                      </p:to>
+                                    </p:set>
+                                    <p:animEffect transition="in" filter="fade">
+                                      <p:cBhvr>
+                                        <p:cTn id="7" dur="500"/>
+                                        <p:tgtEl>
+                                          <p:spTgt spid="3">
+                                            <p:txEl>
+                                              <p:pRg st="0" end="0"/>
+                                            </p:txEl>
+                                          </p:spTgt>
+                                        </p:tgtEl>
+                                      </p:cBhvr>
+                                    </p:animEffect>
+                                  </p:childTnLst>
+                                </p:cTn>
+                              </p:par>
+                            </p:childTnLst>
+                          </p:cTn>
+                        </p:par>
+                      </p:childTnLst>
+                    </p:cTn>
+                  </p:par>
+                </p:childTnLst>
+              </p:cTn>
+              <p:prevCondLst>
+                <p:cond evt="onPrev" delay="0">
+                  <p:tgtEl>
+                    <p:sldTgt/>
+                  </p:tgtEl>
+                </p:cond>
+              </p:prevCondLst>
+              <p:nextCondLst>
+                <p:cond evt="onNext" delay="0">
+                  <p:tgtEl>
+                    <p:sldTgt/>
+                  </p:tgtEl>
+                </p:cond>
+              </p:nextCondLst>
+            </p:seq>
+          </p:childTnLst>
+        </p:cTn>
       </p:par>
     </p:tnLst>
+    <p:bldLst>
+      <p:bldP spid="3" grpId="0" build="p"/>
+    </p:bldLst>
   </p:timing>
 </p:sld>
 </file>
@@ -17626,7 +19254,7 @@
             <a:spLocks noGrp="1"/>
           </p:cNvSpPr>
           <p:nvPr>
-            <p:ph type="ctrTitle"/>
+            <p:ph type="title"/>
           </p:nvPr>
         </p:nvSpPr>
         <p:spPr/>
@@ -17636,16 +19264,45 @@
           <a:p>
             <a:r>
               <a:rPr lang="en-US" dirty="0" smtClean="0"/>
-              <a:t>View vs. Indexes</a:t>
+              <a:t>Explain</a:t>
             </a:r>
             <a:endParaRPr lang="en-US" dirty="0"/>
+          </a:p>
+        </p:txBody>
+      </p:sp>
+      <p:sp>
+        <p:nvSpPr>
+          <p:cNvPr id="3" name="Content Placeholder 2"/>
+          <p:cNvSpPr>
+            <a:spLocks noGrp="1"/>
+          </p:cNvSpPr>
+          <p:nvPr>
+            <p:ph idx="1"/>
+          </p:nvPr>
+        </p:nvSpPr>
+        <p:spPr>
+          <a:xfrm>
+            <a:off x="457200" y="955193"/>
+            <a:ext cx="8007739" cy="3493655"/>
+          </a:xfrm>
+        </p:spPr>
+        <p:txBody>
+          <a:bodyPr/>
+          <a:lstStyle/>
+          <a:p>
+            <a:pPr>
+              <a:lnSpc>
+                <a:spcPct val="140000"/>
+              </a:lnSpc>
+            </a:pPr>
+            <a:endParaRPr lang="en-US" dirty="0" smtClean="0"/>
           </a:p>
         </p:txBody>
       </p:sp>
     </p:spTree>
     <p:extLst>
       <p:ext uri="{BB962C8B-B14F-4D97-AF65-F5344CB8AC3E}">
-        <p14:creationId xmlns:p14="http://schemas.microsoft.com/office/powerpoint/2010/main" val="1029701812"/>
+        <p14:creationId xmlns:p14="http://schemas.microsoft.com/office/powerpoint/2010/main" val="3354008405"/>
       </p:ext>
     </p:extLst>
   </p:cSld>
@@ -17655,9 +19312,101 @@
   <p:timing>
     <p:tnLst>
       <p:par>
-        <p:cTn xmlns:p14="http://schemas.microsoft.com/office/powerpoint/2010/main" id="1" dur="indefinite" restart="never" nodeType="tmRoot"/>
+        <p:cTn xmlns:p14="http://schemas.microsoft.com/office/powerpoint/2010/main" id="1" dur="indefinite" restart="never" nodeType="tmRoot">
+          <p:childTnLst>
+            <p:seq concurrent="1" nextAc="seek">
+              <p:cTn id="2" dur="indefinite" nodeType="mainSeq">
+                <p:childTnLst>
+                  <p:par>
+                    <p:cTn id="3" fill="hold">
+                      <p:stCondLst>
+                        <p:cond delay="indefinite"/>
+                      </p:stCondLst>
+                      <p:childTnLst>
+                        <p:par>
+                          <p:cTn id="4" fill="hold">
+                            <p:stCondLst>
+                              <p:cond delay="0"/>
+                            </p:stCondLst>
+                            <p:childTnLst>
+                              <p:par>
+                                <p:cTn id="5" presetID="10" presetClass="entr" presetSubtype="0" fill="hold" grpId="0" nodeType="clickEffect" nodePh="1">
+                                  <p:stCondLst>
+                                    <p:cond delay="0"/>
+                                  </p:stCondLst>
+                                  <p:endCondLst>
+                                    <p:cond evt="begin" delay="0">
+                                      <p:tn val="5"/>
+                                    </p:cond>
+                                  </p:endCondLst>
+                                  <p:childTnLst>
+                                    <p:set>
+                                      <p:cBhvr>
+                                        <p:cTn id="6" dur="1" fill="hold">
+                                          <p:stCondLst>
+                                            <p:cond delay="0"/>
+                                          </p:stCondLst>
+                                        </p:cTn>
+                                        <p:tgtEl>
+                                          <p:spTgt spid="3">
+                                            <p:txEl>
+                                              <p:pRg st="0" end="0"/>
+                                            </p:txEl>
+                                          </p:spTgt>
+                                        </p:tgtEl>
+                                        <p:attrNameLst>
+                                          <p:attrName>style.visibility</p:attrName>
+                                        </p:attrNameLst>
+                                      </p:cBhvr>
+                                      <p:to>
+                                        <p:strVal val="visible"/>
+                                      </p:to>
+                                    </p:set>
+                                    <p:animEffect transition="in" filter="fade">
+                                      <p:cBhvr>
+                                        <p:cTn id="7" dur="500"/>
+                                        <p:tgtEl>
+                                          <p:spTgt spid="3">
+                                            <p:txEl>
+                                              <p:pRg st="0" end="0"/>
+                                            </p:txEl>
+                                          </p:spTgt>
+                                        </p:tgtEl>
+                                      </p:cBhvr>
+                                    </p:animEffect>
+                                  </p:childTnLst>
+                                </p:cTn>
+                              </p:par>
+                            </p:childTnLst>
+                          </p:cTn>
+                        </p:par>
+                      </p:childTnLst>
+                    </p:cTn>
+                  </p:par>
+                </p:childTnLst>
+              </p:cTn>
+              <p:prevCondLst>
+                <p:cond evt="onPrev" delay="0">
+                  <p:tgtEl>
+                    <p:sldTgt/>
+                  </p:tgtEl>
+                </p:cond>
+              </p:prevCondLst>
+              <p:nextCondLst>
+                <p:cond evt="onNext" delay="0">
+                  <p:tgtEl>
+                    <p:sldTgt/>
+                  </p:tgtEl>
+                </p:cond>
+              </p:nextCondLst>
+            </p:seq>
+          </p:childTnLst>
+        </p:cTn>
       </p:par>
     </p:tnLst>
+    <p:bldLst>
+      <p:bldP spid="3" grpId="0" build="p"/>
+    </p:bldLst>
   </p:timing>
 </p:sld>
 </file>
@@ -17696,7 +19445,7 @@
           <a:p>
             <a:r>
               <a:rPr lang="en-US" dirty="0" smtClean="0"/>
-              <a:t>Views vs. Indexes</a:t>
+              <a:t>Hints</a:t>
             </a:r>
             <a:endParaRPr lang="en-US" dirty="0"/>
           </a:p>
@@ -17704,7 +19453,7 @@
       </p:sp>
       <p:sp>
         <p:nvSpPr>
-          <p:cNvPr id="4" name="Content Placeholder 3"/>
+          <p:cNvPr id="3" name="Content Placeholder 2"/>
           <p:cNvSpPr>
             <a:spLocks noGrp="1"/>
           </p:cNvSpPr>
@@ -17712,355 +19461,29 @@
             <p:ph idx="1"/>
           </p:nvPr>
         </p:nvSpPr>
-        <p:spPr/>
+        <p:spPr>
+          <a:xfrm>
+            <a:off x="457200" y="955193"/>
+            <a:ext cx="8007739" cy="3493655"/>
+          </a:xfrm>
+        </p:spPr>
         <p:txBody>
           <a:bodyPr/>
           <a:lstStyle/>
           <a:p>
-            <a:r>
-              <a:rPr lang="en-US" b="1" dirty="0" smtClean="0"/>
-              <a:t>Global Secondary Indexes vs. Views</a:t>
-            </a:r>
-          </a:p>
-          <a:p>
-            <a:pPr lvl="1"/>
-            <a:r>
-              <a:rPr lang="en-US" b="1" dirty="0" smtClean="0"/>
-              <a:t>GSI – Index Service</a:t>
-            </a:r>
-          </a:p>
-          <a:p>
-            <a:pPr marL="230188" lvl="1" indent="0">
-              <a:buNone/>
+            <a:pPr>
+              <a:lnSpc>
+                <a:spcPct val="140000"/>
+              </a:lnSpc>
             </a:pPr>
-            <a:r>
-              <a:rPr lang="en-US" dirty="0" smtClean="0"/>
-              <a:t>Global Secondary Indexes is a new indexing technology that allows independently partitioned and independently scalable indexes. </a:t>
-            </a:r>
-          </a:p>
-          <a:p>
-            <a:pPr lvl="1"/>
-            <a:endParaRPr lang="en-US" b="1" dirty="0" smtClean="0"/>
-          </a:p>
-          <a:p>
-            <a:pPr lvl="1"/>
-            <a:r>
-              <a:rPr lang="en-US" b="1" dirty="0" smtClean="0"/>
-              <a:t>Views – Data Service</a:t>
-            </a:r>
-          </a:p>
-          <a:p>
-            <a:pPr marL="230188" lvl="1" indent="0">
-              <a:buNone/>
-            </a:pPr>
-            <a:r>
-              <a:rPr lang="en-US" dirty="0" smtClean="0"/>
-              <a:t>Incremental Map/Reduce Views that provide full partition alignment and paired scalability with Data Service. </a:t>
-            </a:r>
-          </a:p>
-        </p:txBody>
-      </p:sp>
-      <p:sp>
-        <p:nvSpPr>
-          <p:cNvPr id="8" name="TextBox 7"/>
-          <p:cNvSpPr txBox="1"/>
-          <p:nvPr/>
-        </p:nvSpPr>
-        <p:spPr>
-          <a:xfrm>
-            <a:off x="7130590" y="4054833"/>
-            <a:ext cx="1186330" cy="369332"/>
-          </a:xfrm>
-          <a:prstGeom prst="rect">
-            <a:avLst/>
-          </a:prstGeom>
-          <a:noFill/>
-        </p:spPr>
-        <p:txBody>
-          <a:bodyPr wrap="none" rtlCol="0">
-            <a:spAutoFit/>
-          </a:bodyPr>
-          <a:lstStyle/>
-          <a:p>
-            <a:r>
-              <a:rPr lang="en-US" sz="1800" dirty="0" smtClean="0"/>
-              <a:t>Index Scan</a:t>
-            </a:r>
-            <a:endParaRPr lang="en-US" sz="1800" dirty="0"/>
-          </a:p>
-        </p:txBody>
-      </p:sp>
-      <p:pic>
-        <p:nvPicPr>
-          <p:cNvPr id="9" name="Picture 8"/>
-          <p:cNvPicPr>
-            <a:picLocks noChangeAspect="1"/>
-          </p:cNvPicPr>
-          <p:nvPr/>
-        </p:nvPicPr>
-        <p:blipFill>
-          <a:blip r:embed="rId2"/>
-          <a:stretch>
-            <a:fillRect/>
-          </a:stretch>
-        </p:blipFill>
-        <p:spPr>
-          <a:xfrm>
-            <a:off x="5726313" y="3431945"/>
-            <a:ext cx="3318322" cy="1711555"/>
-          </a:xfrm>
-          <a:prstGeom prst="rect">
-            <a:avLst/>
-          </a:prstGeom>
-        </p:spPr>
-      </p:pic>
-      <p:sp>
-        <p:nvSpPr>
-          <p:cNvPr id="11" name="Rectangle 10"/>
-          <p:cNvSpPr/>
-          <p:nvPr/>
-        </p:nvSpPr>
-        <p:spPr>
-          <a:xfrm flipH="1" flipV="1">
-            <a:off x="6802863" y="3812639"/>
-            <a:ext cx="1027580" cy="1213152"/>
-          </a:xfrm>
-          <a:prstGeom prst="rect">
-            <a:avLst/>
-          </a:prstGeom>
-          <a:solidFill>
-            <a:schemeClr val="accent1">
-              <a:alpha val="26000"/>
-            </a:schemeClr>
-          </a:solidFill>
-        </p:spPr>
-        <p:style>
-          <a:lnRef idx="1">
-            <a:schemeClr val="accent1"/>
-          </a:lnRef>
-          <a:fillRef idx="3">
-            <a:schemeClr val="accent1"/>
-          </a:fillRef>
-          <a:effectRef idx="2">
-            <a:schemeClr val="accent1"/>
-          </a:effectRef>
-          <a:fontRef idx="minor">
-            <a:schemeClr val="lt1"/>
-          </a:fontRef>
-        </p:style>
-        <p:txBody>
-          <a:bodyPr rtlCol="0" anchor="ctr"/>
-          <a:lstStyle/>
-          <a:p>
-            <a:endParaRPr lang="en-US" sz="2400" dirty="0"/>
-          </a:p>
-        </p:txBody>
-      </p:sp>
-      <p:sp>
-        <p:nvSpPr>
-          <p:cNvPr id="12" name="Rectangle 11"/>
-          <p:cNvSpPr/>
-          <p:nvPr/>
-        </p:nvSpPr>
-        <p:spPr>
-          <a:xfrm>
-            <a:off x="5726313" y="3812639"/>
-            <a:ext cx="1076550" cy="1208547"/>
-          </a:xfrm>
-          <a:prstGeom prst="rect">
-            <a:avLst/>
-          </a:prstGeom>
-          <a:solidFill>
-            <a:schemeClr val="accent5">
-              <a:alpha val="26000"/>
-            </a:schemeClr>
-          </a:solidFill>
-        </p:spPr>
-        <p:style>
-          <a:lnRef idx="1">
-            <a:schemeClr val="accent1"/>
-          </a:lnRef>
-          <a:fillRef idx="3">
-            <a:schemeClr val="accent1"/>
-          </a:fillRef>
-          <a:effectRef idx="2">
-            <a:schemeClr val="accent1"/>
-          </a:effectRef>
-          <a:fontRef idx="minor">
-            <a:schemeClr val="lt1"/>
-          </a:fontRef>
-        </p:style>
-        <p:txBody>
-          <a:bodyPr rtlCol="0" anchor="ctr"/>
-          <a:lstStyle/>
-          <a:p>
-            <a:endParaRPr lang="en-US" sz="2400" dirty="0"/>
-          </a:p>
-        </p:txBody>
-      </p:sp>
-      <p:cxnSp>
-        <p:nvCxnSpPr>
-          <p:cNvPr id="22" name="Elbow Connector 21"/>
-          <p:cNvCxnSpPr>
-            <a:endCxn id="12" idx="0"/>
-          </p:cNvCxnSpPr>
-          <p:nvPr/>
-        </p:nvCxnSpPr>
-        <p:spPr>
-          <a:xfrm>
-            <a:off x="4662883" y="3251962"/>
-            <a:ext cx="1601705" cy="560677"/>
-          </a:xfrm>
-          <a:prstGeom prst="bentConnector2">
-            <a:avLst/>
-          </a:prstGeom>
-          <a:ln w="12700" cmpd="sng">
-            <a:solidFill>
-              <a:srgbClr val="609E0E"/>
-            </a:solidFill>
-          </a:ln>
-          <a:effectLst/>
-        </p:spPr>
-        <p:style>
-          <a:lnRef idx="2">
-            <a:schemeClr val="accent1"/>
-          </a:lnRef>
-          <a:fillRef idx="0">
-            <a:schemeClr val="accent1"/>
-          </a:fillRef>
-          <a:effectRef idx="1">
-            <a:schemeClr val="accent1"/>
-          </a:effectRef>
-          <a:fontRef idx="minor">
-            <a:schemeClr val="tx1"/>
-          </a:fontRef>
-        </p:style>
-      </p:cxnSp>
-      <p:sp>
-        <p:nvSpPr>
-          <p:cNvPr id="23" name="Freeform 22"/>
-          <p:cNvSpPr/>
-          <p:nvPr/>
-        </p:nvSpPr>
-        <p:spPr>
-          <a:xfrm>
-            <a:off x="7280301" y="1939114"/>
-            <a:ext cx="1289321" cy="1880941"/>
-          </a:xfrm>
-          <a:custGeom>
-            <a:avLst/>
-            <a:gdLst>
-              <a:gd name="connsiteX0" fmla="*/ 145412 w 1289321"/>
-              <a:gd name="connsiteY0" fmla="*/ 9696 h 1880941"/>
-              <a:gd name="connsiteX1" fmla="*/ 1289321 w 1289321"/>
-              <a:gd name="connsiteY1" fmla="*/ 9696 h 1880941"/>
-              <a:gd name="connsiteX2" fmla="*/ 1260239 w 1289321"/>
-              <a:gd name="connsiteY2" fmla="*/ 1299206 h 1880941"/>
-              <a:gd name="connsiteX3" fmla="*/ 0 w 1289321"/>
-              <a:gd name="connsiteY3" fmla="*/ 1299206 h 1880941"/>
-              <a:gd name="connsiteX4" fmla="*/ 0 w 1289321"/>
-              <a:gd name="connsiteY4" fmla="*/ 1880941 h 1880941"/>
-              <a:gd name="connsiteX5" fmla="*/ 9694 w 1289321"/>
-              <a:gd name="connsiteY5" fmla="*/ 1289511 h 1880941"/>
-              <a:gd name="connsiteX6" fmla="*/ 1250544 w 1289321"/>
-              <a:gd name="connsiteY6" fmla="*/ 1289511 h 1880941"/>
-              <a:gd name="connsiteX7" fmla="*/ 1269933 w 1289321"/>
-              <a:gd name="connsiteY7" fmla="*/ 0 h 1880941"/>
-              <a:gd name="connsiteX8" fmla="*/ 145412 w 1289321"/>
-              <a:gd name="connsiteY8" fmla="*/ 9696 h 1880941"/>
-            </a:gdLst>
-            <a:ahLst/>
-            <a:cxnLst>
-              <a:cxn ang="0">
-                <a:pos x="connsiteX0" y="connsiteY0"/>
-              </a:cxn>
-              <a:cxn ang="0">
-                <a:pos x="connsiteX1" y="connsiteY1"/>
-              </a:cxn>
-              <a:cxn ang="0">
-                <a:pos x="connsiteX2" y="connsiteY2"/>
-              </a:cxn>
-              <a:cxn ang="0">
-                <a:pos x="connsiteX3" y="connsiteY3"/>
-              </a:cxn>
-              <a:cxn ang="0">
-                <a:pos x="connsiteX4" y="connsiteY4"/>
-              </a:cxn>
-              <a:cxn ang="0">
-                <a:pos x="connsiteX5" y="connsiteY5"/>
-              </a:cxn>
-              <a:cxn ang="0">
-                <a:pos x="connsiteX6" y="connsiteY6"/>
-              </a:cxn>
-              <a:cxn ang="0">
-                <a:pos x="connsiteX7" y="connsiteY7"/>
-              </a:cxn>
-              <a:cxn ang="0">
-                <a:pos x="connsiteX8" y="connsiteY8"/>
-              </a:cxn>
-            </a:cxnLst>
-            <a:rect l="l" t="t" r="r" b="b"/>
-            <a:pathLst>
-              <a:path w="1289321" h="1880941">
-                <a:moveTo>
-                  <a:pt x="145412" y="9696"/>
-                </a:moveTo>
-                <a:lnTo>
-                  <a:pt x="1289321" y="9696"/>
-                </a:lnTo>
-                <a:lnTo>
-                  <a:pt x="1260239" y="1299206"/>
-                </a:lnTo>
-                <a:lnTo>
-                  <a:pt x="0" y="1299206"/>
-                </a:lnTo>
-                <a:lnTo>
-                  <a:pt x="0" y="1880941"/>
-                </a:lnTo>
-                <a:lnTo>
-                  <a:pt x="9694" y="1289511"/>
-                </a:lnTo>
-                <a:lnTo>
-                  <a:pt x="1250544" y="1289511"/>
-                </a:lnTo>
-                <a:lnTo>
-                  <a:pt x="1269933" y="0"/>
-                </a:lnTo>
-                <a:lnTo>
-                  <a:pt x="145412" y="9696"/>
-                </a:lnTo>
-                <a:close/>
-              </a:path>
-            </a:pathLst>
-          </a:custGeom>
-        </p:spPr>
-        <p:style>
-          <a:lnRef idx="1">
-            <a:schemeClr val="accent1"/>
-          </a:lnRef>
-          <a:fillRef idx="3">
-            <a:schemeClr val="accent1"/>
-          </a:fillRef>
-          <a:effectRef idx="2">
-            <a:schemeClr val="accent1"/>
-          </a:effectRef>
-          <a:fontRef idx="minor">
-            <a:schemeClr val="lt1"/>
-          </a:fontRef>
-        </p:style>
-        <p:txBody>
-          <a:bodyPr rtlCol="0" anchor="ctr"/>
-          <a:lstStyle/>
-          <a:p>
-            <a:pPr algn="ctr"/>
-            <a:endParaRPr lang="en-US"/>
+            <a:endParaRPr lang="en-US" dirty="0" smtClean="0"/>
           </a:p>
         </p:txBody>
       </p:sp>
     </p:spTree>
     <p:extLst>
       <p:ext uri="{BB962C8B-B14F-4D97-AF65-F5344CB8AC3E}">
-        <p14:creationId xmlns:p14="http://schemas.microsoft.com/office/powerpoint/2010/main" val="2651426066"/>
+        <p14:creationId xmlns:p14="http://schemas.microsoft.com/office/powerpoint/2010/main" val="2195002502"/>
       </p:ext>
     </p:extLst>
   </p:cSld>
@@ -18070,9 +19493,101 @@
   <p:timing>
     <p:tnLst>
       <p:par>
-        <p:cTn xmlns:p14="http://schemas.microsoft.com/office/powerpoint/2010/main" id="1" dur="indefinite" restart="never" nodeType="tmRoot"/>
+        <p:cTn xmlns:p14="http://schemas.microsoft.com/office/powerpoint/2010/main" id="1" dur="indefinite" restart="never" nodeType="tmRoot">
+          <p:childTnLst>
+            <p:seq concurrent="1" nextAc="seek">
+              <p:cTn id="2" dur="indefinite" nodeType="mainSeq">
+                <p:childTnLst>
+                  <p:par>
+                    <p:cTn id="3" fill="hold">
+                      <p:stCondLst>
+                        <p:cond delay="indefinite"/>
+                      </p:stCondLst>
+                      <p:childTnLst>
+                        <p:par>
+                          <p:cTn id="4" fill="hold">
+                            <p:stCondLst>
+                              <p:cond delay="0"/>
+                            </p:stCondLst>
+                            <p:childTnLst>
+                              <p:par>
+                                <p:cTn id="5" presetID="10" presetClass="entr" presetSubtype="0" fill="hold" grpId="0" nodeType="clickEffect" nodePh="1">
+                                  <p:stCondLst>
+                                    <p:cond delay="0"/>
+                                  </p:stCondLst>
+                                  <p:endCondLst>
+                                    <p:cond evt="begin" delay="0">
+                                      <p:tn val="5"/>
+                                    </p:cond>
+                                  </p:endCondLst>
+                                  <p:childTnLst>
+                                    <p:set>
+                                      <p:cBhvr>
+                                        <p:cTn id="6" dur="1" fill="hold">
+                                          <p:stCondLst>
+                                            <p:cond delay="0"/>
+                                          </p:stCondLst>
+                                        </p:cTn>
+                                        <p:tgtEl>
+                                          <p:spTgt spid="3">
+                                            <p:txEl>
+                                              <p:pRg st="0" end="0"/>
+                                            </p:txEl>
+                                          </p:spTgt>
+                                        </p:tgtEl>
+                                        <p:attrNameLst>
+                                          <p:attrName>style.visibility</p:attrName>
+                                        </p:attrNameLst>
+                                      </p:cBhvr>
+                                      <p:to>
+                                        <p:strVal val="visible"/>
+                                      </p:to>
+                                    </p:set>
+                                    <p:animEffect transition="in" filter="fade">
+                                      <p:cBhvr>
+                                        <p:cTn id="7" dur="500"/>
+                                        <p:tgtEl>
+                                          <p:spTgt spid="3">
+                                            <p:txEl>
+                                              <p:pRg st="0" end="0"/>
+                                            </p:txEl>
+                                          </p:spTgt>
+                                        </p:tgtEl>
+                                      </p:cBhvr>
+                                    </p:animEffect>
+                                  </p:childTnLst>
+                                </p:cTn>
+                              </p:par>
+                            </p:childTnLst>
+                          </p:cTn>
+                        </p:par>
+                      </p:childTnLst>
+                    </p:cTn>
+                  </p:par>
+                </p:childTnLst>
+              </p:cTn>
+              <p:prevCondLst>
+                <p:cond evt="onPrev" delay="0">
+                  <p:tgtEl>
+                    <p:sldTgt/>
+                  </p:tgtEl>
+                </p:cond>
+              </p:prevCondLst>
+              <p:nextCondLst>
+                <p:cond evt="onNext" delay="0">
+                  <p:tgtEl>
+                    <p:sldTgt/>
+                  </p:tgtEl>
+                </p:cond>
+              </p:nextCondLst>
+            </p:seq>
+          </p:childTnLst>
+        </p:cTn>
       </p:par>
     </p:tnLst>
+    <p:bldLst>
+      <p:bldP spid="3" grpId="0" build="p"/>
+    </p:bldLst>
   </p:timing>
 </p:sld>
 </file>

</xml_diff>